<commit_message>
another night of resarch and content :)
</commit_message>
<xml_diff>
--- a/docs/figures.pptx
+++ b/docs/figures.pptx
@@ -3344,8 +3344,8 @@
         </p:nvSpPr>
         <p:spPr>
           <a:xfrm>
-            <a:off x="0" y="-1"/>
-            <a:ext cx="12192000" cy="5260369"/>
+            <a:off x="0" y="4006921"/>
+            <a:ext cx="12192000" cy="1828800"/>
           </a:xfrm>
         </p:spPr>
         <p:txBody>

</xml_diff>

<commit_message>
added caption to images and code
</commit_message>
<xml_diff>
--- a/docs/figures.pptx
+++ b/docs/figures.pptx
@@ -6,6 +6,9 @@
   </p:sldMasterIdLst>
   <p:sldIdLst>
     <p:sldId id="256" r:id="rId2"/>
+    <p:sldId id="257" r:id="rId3"/>
+    <p:sldId id="258" r:id="rId4"/>
+    <p:sldId id="259" r:id="rId5"/>
   </p:sldIdLst>
   <p:sldSz cx="12192000" cy="6858000"/>
   <p:notesSz cx="6858000" cy="9144000"/>
@@ -104,6 +107,11 @@
       </a:defRPr>
     </a:lvl9pPr>
   </p:defaultTextStyle>
+  <p:extLst>
+    <p:ext uri="{EFAFB233-063F-42B5-8137-9DF3F51BA10A}">
+      <p15:sldGuideLst xmlns:p15="http://schemas.microsoft.com/office/powerpoint/2012/main"/>
+    </p:ext>
+  </p:extLst>
 </p:presentation>
 </file>
 
@@ -254,7 +262,7 @@
           <a:p>
             <a:fld id="{96741C76-42BE-4049-AA11-3CDD6779F256}" type="datetimeFigureOut">
               <a:rPr lang="en-US" smtClean="0"/>
-              <a:t>5/2/2018</a:t>
+              <a:t>5/4/2018</a:t>
             </a:fld>
             <a:endParaRPr lang="en-US"/>
           </a:p>
@@ -452,7 +460,7 @@
           <a:p>
             <a:fld id="{96741C76-42BE-4049-AA11-3CDD6779F256}" type="datetimeFigureOut">
               <a:rPr lang="en-US" smtClean="0"/>
-              <a:t>5/2/2018</a:t>
+              <a:t>5/4/2018</a:t>
             </a:fld>
             <a:endParaRPr lang="en-US"/>
           </a:p>
@@ -660,7 +668,7 @@
           <a:p>
             <a:fld id="{96741C76-42BE-4049-AA11-3CDD6779F256}" type="datetimeFigureOut">
               <a:rPr lang="en-US" smtClean="0"/>
-              <a:t>5/2/2018</a:t>
+              <a:t>5/4/2018</a:t>
             </a:fld>
             <a:endParaRPr lang="en-US"/>
           </a:p>
@@ -858,7 +866,7 @@
           <a:p>
             <a:fld id="{96741C76-42BE-4049-AA11-3CDD6779F256}" type="datetimeFigureOut">
               <a:rPr lang="en-US" smtClean="0"/>
-              <a:t>5/2/2018</a:t>
+              <a:t>5/4/2018</a:t>
             </a:fld>
             <a:endParaRPr lang="en-US"/>
           </a:p>
@@ -1133,7 +1141,7 @@
           <a:p>
             <a:fld id="{96741C76-42BE-4049-AA11-3CDD6779F256}" type="datetimeFigureOut">
               <a:rPr lang="en-US" smtClean="0"/>
-              <a:t>5/2/2018</a:t>
+              <a:t>5/4/2018</a:t>
             </a:fld>
             <a:endParaRPr lang="en-US"/>
           </a:p>
@@ -1398,7 +1406,7 @@
           <a:p>
             <a:fld id="{96741C76-42BE-4049-AA11-3CDD6779F256}" type="datetimeFigureOut">
               <a:rPr lang="en-US" smtClean="0"/>
-              <a:t>5/2/2018</a:t>
+              <a:t>5/4/2018</a:t>
             </a:fld>
             <a:endParaRPr lang="en-US"/>
           </a:p>
@@ -1810,7 +1818,7 @@
           <a:p>
             <a:fld id="{96741C76-42BE-4049-AA11-3CDD6779F256}" type="datetimeFigureOut">
               <a:rPr lang="en-US" smtClean="0"/>
-              <a:t>5/2/2018</a:t>
+              <a:t>5/4/2018</a:t>
             </a:fld>
             <a:endParaRPr lang="en-US"/>
           </a:p>
@@ -1951,7 +1959,7 @@
           <a:p>
             <a:fld id="{96741C76-42BE-4049-AA11-3CDD6779F256}" type="datetimeFigureOut">
               <a:rPr lang="en-US" smtClean="0"/>
-              <a:t>5/2/2018</a:t>
+              <a:t>5/4/2018</a:t>
             </a:fld>
             <a:endParaRPr lang="en-US"/>
           </a:p>
@@ -2064,7 +2072,7 @@
           <a:p>
             <a:fld id="{96741C76-42BE-4049-AA11-3CDD6779F256}" type="datetimeFigureOut">
               <a:rPr lang="en-US" smtClean="0"/>
-              <a:t>5/2/2018</a:t>
+              <a:t>5/4/2018</a:t>
             </a:fld>
             <a:endParaRPr lang="en-US"/>
           </a:p>
@@ -2375,7 +2383,7 @@
           <a:p>
             <a:fld id="{96741C76-42BE-4049-AA11-3CDD6779F256}" type="datetimeFigureOut">
               <a:rPr lang="en-US" smtClean="0"/>
-              <a:t>5/2/2018</a:t>
+              <a:t>5/4/2018</a:t>
             </a:fld>
             <a:endParaRPr lang="en-US"/>
           </a:p>
@@ -2663,7 +2671,7 @@
           <a:p>
             <a:fld id="{96741C76-42BE-4049-AA11-3CDD6779F256}" type="datetimeFigureOut">
               <a:rPr lang="en-US" smtClean="0"/>
-              <a:t>5/2/2018</a:t>
+              <a:t>5/4/2018</a:t>
             </a:fld>
             <a:endParaRPr lang="en-US"/>
           </a:p>
@@ -2909,7 +2917,7 @@
           <a:p>
             <a:fld id="{96741C76-42BE-4049-AA11-3CDD6779F256}" type="datetimeFigureOut">
               <a:rPr lang="en-US" smtClean="0"/>
-              <a:t>5/2/2018</a:t>
+              <a:t>5/4/2018</a:t>
             </a:fld>
             <a:endParaRPr lang="en-US"/>
           </a:p>
@@ -3424,6 +3432,3057 @@
 </p:sld>
 </file>
 
+<file path=ppt/slides/slide2.xml><?xml version="1.0" encoding="utf-8"?>
+<p:sld xmlns:a="http://schemas.openxmlformats.org/drawingml/2006/main" xmlns:r="http://schemas.openxmlformats.org/officeDocument/2006/relationships" xmlns:p="http://schemas.openxmlformats.org/presentationml/2006/main">
+  <p:cSld>
+    <p:spTree>
+      <p:nvGrpSpPr>
+        <p:cNvPr id="1" name=""/>
+        <p:cNvGrpSpPr/>
+        <p:nvPr/>
+      </p:nvGrpSpPr>
+      <p:grpSpPr>
+        <a:xfrm>
+          <a:off x="0" y="0"/>
+          <a:ext cx="0" cy="0"/>
+          <a:chOff x="0" y="0"/>
+          <a:chExt cx="0" cy="0"/>
+        </a:xfrm>
+      </p:grpSpPr>
+      <p:pic>
+        <p:nvPicPr>
+          <p:cNvPr id="30" name="Picture 29" descr="A close up of a logo&#10;&#10;Description generated with high confidence">
+            <a:extLst>
+              <a:ext uri="{FF2B5EF4-FFF2-40B4-BE49-F238E27FC236}">
+                <a16:creationId xmlns:a16="http://schemas.microsoft.com/office/drawing/2014/main" id="{3E2B6E0F-C632-4EF9-B48F-FB67B1A6DE61}"/>
+              </a:ext>
+            </a:extLst>
+          </p:cNvPr>
+          <p:cNvPicPr>
+            <a:picLocks noChangeAspect="1"/>
+          </p:cNvPicPr>
+          <p:nvPr/>
+        </p:nvPicPr>
+        <p:blipFill>
+          <a:blip r:embed="rId2">
+            <a:duotone>
+              <a:prstClr val="black"/>
+              <a:srgbClr val="000000">
+                <a:alpha val="50196"/>
+                <a:tint val="45000"/>
+                <a:satMod val="400000"/>
+              </a:srgbClr>
+            </a:duotone>
+            <a:extLst>
+              <a:ext uri="{28A0092B-C50C-407E-A947-70E740481C1C}">
+                <a14:useLocalDpi xmlns:a14="http://schemas.microsoft.com/office/drawing/2010/main" val="0"/>
+              </a:ext>
+            </a:extLst>
+          </a:blip>
+          <a:stretch>
+            <a:fillRect/>
+          </a:stretch>
+        </p:blipFill>
+        <p:spPr>
+          <a:xfrm>
+            <a:off x="778768" y="175794"/>
+            <a:ext cx="10296156" cy="6682206"/>
+          </a:xfrm>
+          <a:prstGeom prst="rect">
+            <a:avLst/>
+          </a:prstGeom>
+          <a:effectLst>
+            <a:softEdge rad="76200"/>
+          </a:effectLst>
+        </p:spPr>
+      </p:pic>
+      <p:sp>
+        <p:nvSpPr>
+          <p:cNvPr id="4" name="Flowchart: Magnetic Disk 3">
+            <a:extLst>
+              <a:ext uri="{FF2B5EF4-FFF2-40B4-BE49-F238E27FC236}">
+                <a16:creationId xmlns:a16="http://schemas.microsoft.com/office/drawing/2014/main" id="{CF5837E7-8D9B-479E-9B4E-F8097E21FB00}"/>
+              </a:ext>
+            </a:extLst>
+          </p:cNvPr>
+          <p:cNvSpPr/>
+          <p:nvPr/>
+        </p:nvSpPr>
+        <p:spPr>
+          <a:xfrm>
+            <a:off x="1749836" y="3602563"/>
+            <a:ext cx="2740423" cy="1724928"/>
+          </a:xfrm>
+          <a:prstGeom prst="flowChartMagneticDisk">
+            <a:avLst/>
+          </a:prstGeom>
+          <a:solidFill>
+            <a:schemeClr val="accent1">
+              <a:lumMod val="40000"/>
+              <a:lumOff val="60000"/>
+            </a:schemeClr>
+          </a:solidFill>
+          <a:ln>
+            <a:solidFill>
+              <a:schemeClr val="tx1"/>
+            </a:solidFill>
+          </a:ln>
+        </p:spPr>
+        <p:style>
+          <a:lnRef idx="2">
+            <a:schemeClr val="accent1">
+              <a:shade val="50000"/>
+            </a:schemeClr>
+          </a:lnRef>
+          <a:fillRef idx="1">
+            <a:schemeClr val="accent1"/>
+          </a:fillRef>
+          <a:effectRef idx="0">
+            <a:schemeClr val="accent1"/>
+          </a:effectRef>
+          <a:fontRef idx="minor">
+            <a:schemeClr val="lt1"/>
+          </a:fontRef>
+        </p:style>
+        <p:txBody>
+          <a:bodyPr rtlCol="0" anchor="ctr"/>
+          <a:lstStyle/>
+          <a:p>
+            <a:pPr algn="ctr"/>
+            <a:endParaRPr lang="en-US" dirty="0"/>
+          </a:p>
+        </p:txBody>
+      </p:sp>
+      <p:sp>
+        <p:nvSpPr>
+          <p:cNvPr id="3" name="Content Placeholder 2">
+            <a:extLst>
+              <a:ext uri="{FF2B5EF4-FFF2-40B4-BE49-F238E27FC236}">
+                <a16:creationId xmlns:a16="http://schemas.microsoft.com/office/drawing/2014/main" id="{1CDFE8F8-4A3D-4967-88EB-B3054A135728}"/>
+              </a:ext>
+            </a:extLst>
+          </p:cNvPr>
+          <p:cNvSpPr>
+            <a:spLocks noGrp="1"/>
+          </p:cNvSpPr>
+          <p:nvPr>
+            <p:ph idx="1"/>
+          </p:nvPr>
+        </p:nvSpPr>
+        <p:spPr>
+          <a:xfrm>
+            <a:off x="1749836" y="4292455"/>
+            <a:ext cx="2740423" cy="646848"/>
+          </a:xfrm>
+        </p:spPr>
+        <p:txBody>
+          <a:bodyPr>
+            <a:normAutofit/>
+          </a:bodyPr>
+          <a:lstStyle/>
+          <a:p>
+            <a:pPr marL="0" indent="0" algn="ctr">
+              <a:buNone/>
+            </a:pPr>
+            <a:r>
+              <a:rPr lang="en-US" b="1" dirty="0">
+                <a:solidFill>
+                  <a:schemeClr val="bg1"/>
+                </a:solidFill>
+                <a:latin typeface="Segoe UI Emoji" panose="020B0502040204020203" pitchFamily="34" charset="0"/>
+                <a:ea typeface="Segoe UI Emoji" panose="020B0502040204020203" pitchFamily="34" charset="0"/>
+              </a:rPr>
+              <a:t>Data Warehouse</a:t>
+            </a:r>
+          </a:p>
+        </p:txBody>
+      </p:sp>
+      <p:grpSp>
+        <p:nvGrpSpPr>
+          <p:cNvPr id="23" name="Group 22">
+            <a:extLst>
+              <a:ext uri="{FF2B5EF4-FFF2-40B4-BE49-F238E27FC236}">
+                <a16:creationId xmlns:a16="http://schemas.microsoft.com/office/drawing/2014/main" id="{EA2F3111-1AB7-4265-9BAF-C77FCAFFDCE2}"/>
+              </a:ext>
+            </a:extLst>
+          </p:cNvPr>
+          <p:cNvGrpSpPr/>
+          <p:nvPr/>
+        </p:nvGrpSpPr>
+        <p:grpSpPr>
+          <a:xfrm>
+            <a:off x="4426122" y="3576553"/>
+            <a:ext cx="2740423" cy="1724928"/>
+            <a:chOff x="3898395" y="4836898"/>
+            <a:chExt cx="2740423" cy="1724928"/>
+          </a:xfrm>
+        </p:grpSpPr>
+        <p:sp>
+          <p:nvSpPr>
+            <p:cNvPr id="5" name="Flowchart: Magnetic Disk 4">
+              <a:extLst>
+                <a:ext uri="{FF2B5EF4-FFF2-40B4-BE49-F238E27FC236}">
+                  <a16:creationId xmlns:a16="http://schemas.microsoft.com/office/drawing/2014/main" id="{305B5DAE-7DFD-435E-8642-F642D328D24F}"/>
+                </a:ext>
+              </a:extLst>
+            </p:cNvPr>
+            <p:cNvSpPr/>
+            <p:nvPr/>
+          </p:nvSpPr>
+          <p:spPr>
+            <a:xfrm>
+              <a:off x="3898395" y="4836898"/>
+              <a:ext cx="2740423" cy="1724928"/>
+            </a:xfrm>
+            <a:prstGeom prst="flowChartMagneticDisk">
+              <a:avLst/>
+            </a:prstGeom>
+            <a:solidFill>
+              <a:schemeClr val="accent1">
+                <a:lumMod val="40000"/>
+                <a:lumOff val="60000"/>
+              </a:schemeClr>
+            </a:solidFill>
+          </p:spPr>
+          <p:style>
+            <a:lnRef idx="2">
+              <a:schemeClr val="accent1">
+                <a:shade val="50000"/>
+              </a:schemeClr>
+            </a:lnRef>
+            <a:fillRef idx="1">
+              <a:schemeClr val="accent1"/>
+            </a:fillRef>
+            <a:effectRef idx="0">
+              <a:schemeClr val="accent1"/>
+            </a:effectRef>
+            <a:fontRef idx="minor">
+              <a:schemeClr val="lt1"/>
+            </a:fontRef>
+          </p:style>
+          <p:txBody>
+            <a:bodyPr rtlCol="0" anchor="ctr"/>
+            <a:lstStyle/>
+            <a:p>
+              <a:pPr algn="ctr"/>
+              <a:endParaRPr lang="en-US"/>
+            </a:p>
+          </p:txBody>
+        </p:sp>
+        <p:sp>
+          <p:nvSpPr>
+            <p:cNvPr id="6" name="Content Placeholder 2">
+              <a:extLst>
+                <a:ext uri="{FF2B5EF4-FFF2-40B4-BE49-F238E27FC236}">
+                  <a16:creationId xmlns:a16="http://schemas.microsoft.com/office/drawing/2014/main" id="{DD33CDA0-2A1C-4D7E-B5A2-DAA7A72092FC}"/>
+                </a:ext>
+              </a:extLst>
+            </p:cNvPr>
+            <p:cNvSpPr txBox="1">
+              <a:spLocks/>
+            </p:cNvSpPr>
+            <p:nvPr/>
+          </p:nvSpPr>
+          <p:spPr>
+            <a:xfrm>
+              <a:off x="3898395" y="5526790"/>
+              <a:ext cx="2740423" cy="646848"/>
+            </a:xfrm>
+            <a:prstGeom prst="rect">
+              <a:avLst/>
+            </a:prstGeom>
+          </p:spPr>
+          <p:txBody>
+            <a:bodyPr vert="horz" lIns="91440" tIns="45720" rIns="91440" bIns="45720" rtlCol="0">
+              <a:normAutofit/>
+            </a:bodyPr>
+            <a:lstStyle>
+              <a:lvl1pPr marL="228600" indent="-228600" algn="l" defTabSz="914400" rtl="0" eaLnBrk="1" latinLnBrk="0" hangingPunct="1">
+                <a:lnSpc>
+                  <a:spcPct val="90000"/>
+                </a:lnSpc>
+                <a:spcBef>
+                  <a:spcPts val="1000"/>
+                </a:spcBef>
+                <a:buFont typeface="Arial" panose="020B0604020202020204" pitchFamily="34" charset="0"/>
+                <a:buChar char="•"/>
+                <a:defRPr sz="2800" kern="1200">
+                  <a:solidFill>
+                    <a:schemeClr val="tx1"/>
+                  </a:solidFill>
+                  <a:latin typeface="+mn-lt"/>
+                  <a:ea typeface="+mn-ea"/>
+                  <a:cs typeface="+mn-cs"/>
+                </a:defRPr>
+              </a:lvl1pPr>
+              <a:lvl2pPr marL="685800" indent="-228600" algn="l" defTabSz="914400" rtl="0" eaLnBrk="1" latinLnBrk="0" hangingPunct="1">
+                <a:lnSpc>
+                  <a:spcPct val="90000"/>
+                </a:lnSpc>
+                <a:spcBef>
+                  <a:spcPts val="500"/>
+                </a:spcBef>
+                <a:buFont typeface="Arial" panose="020B0604020202020204" pitchFamily="34" charset="0"/>
+                <a:buChar char="•"/>
+                <a:defRPr sz="2400" kern="1200">
+                  <a:solidFill>
+                    <a:schemeClr val="tx1"/>
+                  </a:solidFill>
+                  <a:latin typeface="+mn-lt"/>
+                  <a:ea typeface="+mn-ea"/>
+                  <a:cs typeface="+mn-cs"/>
+                </a:defRPr>
+              </a:lvl2pPr>
+              <a:lvl3pPr marL="1143000" indent="-228600" algn="l" defTabSz="914400" rtl="0" eaLnBrk="1" latinLnBrk="0" hangingPunct="1">
+                <a:lnSpc>
+                  <a:spcPct val="90000"/>
+                </a:lnSpc>
+                <a:spcBef>
+                  <a:spcPts val="500"/>
+                </a:spcBef>
+                <a:buFont typeface="Arial" panose="020B0604020202020204" pitchFamily="34" charset="0"/>
+                <a:buChar char="•"/>
+                <a:defRPr sz="2000" kern="1200">
+                  <a:solidFill>
+                    <a:schemeClr val="tx1"/>
+                  </a:solidFill>
+                  <a:latin typeface="+mn-lt"/>
+                  <a:ea typeface="+mn-ea"/>
+                  <a:cs typeface="+mn-cs"/>
+                </a:defRPr>
+              </a:lvl3pPr>
+              <a:lvl4pPr marL="1600200" indent="-228600" algn="l" defTabSz="914400" rtl="0" eaLnBrk="1" latinLnBrk="0" hangingPunct="1">
+                <a:lnSpc>
+                  <a:spcPct val="90000"/>
+                </a:lnSpc>
+                <a:spcBef>
+                  <a:spcPts val="500"/>
+                </a:spcBef>
+                <a:buFont typeface="Arial" panose="020B0604020202020204" pitchFamily="34" charset="0"/>
+                <a:buChar char="•"/>
+                <a:defRPr sz="1800" kern="1200">
+                  <a:solidFill>
+                    <a:schemeClr val="tx1"/>
+                  </a:solidFill>
+                  <a:latin typeface="+mn-lt"/>
+                  <a:ea typeface="+mn-ea"/>
+                  <a:cs typeface="+mn-cs"/>
+                </a:defRPr>
+              </a:lvl4pPr>
+              <a:lvl5pPr marL="2057400" indent="-228600" algn="l" defTabSz="914400" rtl="0" eaLnBrk="1" latinLnBrk="0" hangingPunct="1">
+                <a:lnSpc>
+                  <a:spcPct val="90000"/>
+                </a:lnSpc>
+                <a:spcBef>
+                  <a:spcPts val="500"/>
+                </a:spcBef>
+                <a:buFont typeface="Arial" panose="020B0604020202020204" pitchFamily="34" charset="0"/>
+                <a:buChar char="•"/>
+                <a:defRPr sz="1800" kern="1200">
+                  <a:solidFill>
+                    <a:schemeClr val="tx1"/>
+                  </a:solidFill>
+                  <a:latin typeface="+mn-lt"/>
+                  <a:ea typeface="+mn-ea"/>
+                  <a:cs typeface="+mn-cs"/>
+                </a:defRPr>
+              </a:lvl5pPr>
+              <a:lvl6pPr marL="2514600" indent="-228600" algn="l" defTabSz="914400" rtl="0" eaLnBrk="1" latinLnBrk="0" hangingPunct="1">
+                <a:lnSpc>
+                  <a:spcPct val="90000"/>
+                </a:lnSpc>
+                <a:spcBef>
+                  <a:spcPts val="500"/>
+                </a:spcBef>
+                <a:buFont typeface="Arial" panose="020B0604020202020204" pitchFamily="34" charset="0"/>
+                <a:buChar char="•"/>
+                <a:defRPr sz="1800" kern="1200">
+                  <a:solidFill>
+                    <a:schemeClr val="tx1"/>
+                  </a:solidFill>
+                  <a:latin typeface="+mn-lt"/>
+                  <a:ea typeface="+mn-ea"/>
+                  <a:cs typeface="+mn-cs"/>
+                </a:defRPr>
+              </a:lvl6pPr>
+              <a:lvl7pPr marL="2971800" indent="-228600" algn="l" defTabSz="914400" rtl="0" eaLnBrk="1" latinLnBrk="0" hangingPunct="1">
+                <a:lnSpc>
+                  <a:spcPct val="90000"/>
+                </a:lnSpc>
+                <a:spcBef>
+                  <a:spcPts val="500"/>
+                </a:spcBef>
+                <a:buFont typeface="Arial" panose="020B0604020202020204" pitchFamily="34" charset="0"/>
+                <a:buChar char="•"/>
+                <a:defRPr sz="1800" kern="1200">
+                  <a:solidFill>
+                    <a:schemeClr val="tx1"/>
+                  </a:solidFill>
+                  <a:latin typeface="+mn-lt"/>
+                  <a:ea typeface="+mn-ea"/>
+                  <a:cs typeface="+mn-cs"/>
+                </a:defRPr>
+              </a:lvl7pPr>
+              <a:lvl8pPr marL="3429000" indent="-228600" algn="l" defTabSz="914400" rtl="0" eaLnBrk="1" latinLnBrk="0" hangingPunct="1">
+                <a:lnSpc>
+                  <a:spcPct val="90000"/>
+                </a:lnSpc>
+                <a:spcBef>
+                  <a:spcPts val="500"/>
+                </a:spcBef>
+                <a:buFont typeface="Arial" panose="020B0604020202020204" pitchFamily="34" charset="0"/>
+                <a:buChar char="•"/>
+                <a:defRPr sz="1800" kern="1200">
+                  <a:solidFill>
+                    <a:schemeClr val="tx1"/>
+                  </a:solidFill>
+                  <a:latin typeface="+mn-lt"/>
+                  <a:ea typeface="+mn-ea"/>
+                  <a:cs typeface="+mn-cs"/>
+                </a:defRPr>
+              </a:lvl8pPr>
+              <a:lvl9pPr marL="3886200" indent="-228600" algn="l" defTabSz="914400" rtl="0" eaLnBrk="1" latinLnBrk="0" hangingPunct="1">
+                <a:lnSpc>
+                  <a:spcPct val="90000"/>
+                </a:lnSpc>
+                <a:spcBef>
+                  <a:spcPts val="500"/>
+                </a:spcBef>
+                <a:buFont typeface="Arial" panose="020B0604020202020204" pitchFamily="34" charset="0"/>
+                <a:buChar char="•"/>
+                <a:defRPr sz="1800" kern="1200">
+                  <a:solidFill>
+                    <a:schemeClr val="tx1"/>
+                  </a:solidFill>
+                  <a:latin typeface="+mn-lt"/>
+                  <a:ea typeface="+mn-ea"/>
+                  <a:cs typeface="+mn-cs"/>
+                </a:defRPr>
+              </a:lvl9pPr>
+            </a:lstStyle>
+            <a:p>
+              <a:pPr marL="0" indent="0" algn="ctr">
+                <a:buFont typeface="Arial" panose="020B0604020202020204" pitchFamily="34" charset="0"/>
+                <a:buNone/>
+              </a:pPr>
+              <a:r>
+                <a:rPr lang="en-US" b="1" dirty="0">
+                  <a:solidFill>
+                    <a:schemeClr val="bg1"/>
+                  </a:solidFill>
+                  <a:latin typeface="Segoe UI Emoji" panose="020B0502040204020203" pitchFamily="34" charset="0"/>
+                  <a:ea typeface="Segoe UI Emoji" panose="020B0502040204020203" pitchFamily="34" charset="0"/>
+                </a:rPr>
+                <a:t>Data Warehouse</a:t>
+              </a:r>
+            </a:p>
+          </p:txBody>
+        </p:sp>
+      </p:grpSp>
+      <p:cxnSp>
+        <p:nvCxnSpPr>
+          <p:cNvPr id="8" name="Straight Arrow Connector 7">
+            <a:extLst>
+              <a:ext uri="{FF2B5EF4-FFF2-40B4-BE49-F238E27FC236}">
+                <a16:creationId xmlns:a16="http://schemas.microsoft.com/office/drawing/2014/main" id="{FFA85AEE-3FC7-43E2-AABD-1FC5423D7FA0}"/>
+              </a:ext>
+            </a:extLst>
+          </p:cNvPr>
+          <p:cNvCxnSpPr>
+            <a:cxnSpLocks/>
+            <a:stCxn id="4" idx="1"/>
+          </p:cNvCxnSpPr>
+          <p:nvPr/>
+        </p:nvCxnSpPr>
+        <p:spPr>
+          <a:xfrm flipV="1">
+            <a:off x="3120048" y="2863905"/>
+            <a:ext cx="2072029" cy="738658"/>
+          </a:xfrm>
+          <a:prstGeom prst="straightConnector1">
+            <a:avLst/>
+          </a:prstGeom>
+          <a:ln w="19050">
+            <a:solidFill>
+              <a:schemeClr val="tx1"/>
+            </a:solidFill>
+            <a:prstDash val="dash"/>
+            <a:headEnd type="triangle"/>
+            <a:tailEnd type="triangle"/>
+          </a:ln>
+        </p:spPr>
+        <p:style>
+          <a:lnRef idx="1">
+            <a:schemeClr val="accent1"/>
+          </a:lnRef>
+          <a:fillRef idx="0">
+            <a:schemeClr val="accent1"/>
+          </a:fillRef>
+          <a:effectRef idx="0">
+            <a:schemeClr val="accent1"/>
+          </a:effectRef>
+          <a:fontRef idx="minor">
+            <a:schemeClr val="tx1"/>
+          </a:fontRef>
+        </p:style>
+      </p:cxnSp>
+      <p:cxnSp>
+        <p:nvCxnSpPr>
+          <p:cNvPr id="11" name="Straight Arrow Connector 10">
+            <a:extLst>
+              <a:ext uri="{FF2B5EF4-FFF2-40B4-BE49-F238E27FC236}">
+                <a16:creationId xmlns:a16="http://schemas.microsoft.com/office/drawing/2014/main" id="{99643EC8-4F43-4877-BC36-C9AEE4D4D6D9}"/>
+              </a:ext>
+            </a:extLst>
+          </p:cNvPr>
+          <p:cNvCxnSpPr>
+            <a:cxnSpLocks/>
+            <a:stCxn id="5" idx="1"/>
+            <a:endCxn id="16" idx="2"/>
+          </p:cNvCxnSpPr>
+          <p:nvPr/>
+        </p:nvCxnSpPr>
+        <p:spPr>
+          <a:xfrm flipH="1" flipV="1">
+            <a:off x="5796333" y="3123183"/>
+            <a:ext cx="1" cy="453370"/>
+          </a:xfrm>
+          <a:prstGeom prst="straightConnector1">
+            <a:avLst/>
+          </a:prstGeom>
+          <a:ln w="19050">
+            <a:solidFill>
+              <a:schemeClr val="tx1"/>
+            </a:solidFill>
+            <a:prstDash val="dash"/>
+            <a:headEnd type="triangle"/>
+            <a:tailEnd type="triangle"/>
+          </a:ln>
+        </p:spPr>
+        <p:style>
+          <a:lnRef idx="1">
+            <a:schemeClr val="accent1"/>
+          </a:lnRef>
+          <a:fillRef idx="0">
+            <a:schemeClr val="accent1"/>
+          </a:fillRef>
+          <a:effectRef idx="0">
+            <a:schemeClr val="accent1"/>
+          </a:effectRef>
+          <a:fontRef idx="minor">
+            <a:schemeClr val="tx1"/>
+          </a:fontRef>
+        </p:style>
+      </p:cxnSp>
+      <p:pic>
+        <p:nvPicPr>
+          <p:cNvPr id="16" name="Graphic 15">
+            <a:extLst>
+              <a:ext uri="{FF2B5EF4-FFF2-40B4-BE49-F238E27FC236}">
+                <a16:creationId xmlns:a16="http://schemas.microsoft.com/office/drawing/2014/main" id="{24E16078-1A39-4A1F-97F1-8807CAE4CA65}"/>
+              </a:ext>
+            </a:extLst>
+          </p:cNvPr>
+          <p:cNvPicPr>
+            <a:picLocks noChangeAspect="1"/>
+          </p:cNvPicPr>
+          <p:nvPr/>
+        </p:nvPicPr>
+        <p:blipFill>
+          <a:blip r:embed="rId3">
+            <a:extLst>
+              <a:ext uri="{28A0092B-C50C-407E-A947-70E740481C1C}">
+                <a14:useLocalDpi xmlns:a14="http://schemas.microsoft.com/office/drawing/2010/main" val="0"/>
+              </a:ext>
+              <a:ext uri="{96DAC541-7B7A-43D3-8B79-37D633B846F1}">
+                <asvg:svgBlip xmlns:asvg="http://schemas.microsoft.com/office/drawing/2016/SVG/main" r:embed="rId4"/>
+              </a:ext>
+            </a:extLst>
+          </a:blip>
+          <a:stretch>
+            <a:fillRect/>
+          </a:stretch>
+        </p:blipFill>
+        <p:spPr>
+          <a:xfrm>
+            <a:off x="4998017" y="1526551"/>
+            <a:ext cx="1596632" cy="1596632"/>
+          </a:xfrm>
+          <a:prstGeom prst="rect">
+            <a:avLst/>
+          </a:prstGeom>
+        </p:spPr>
+      </p:pic>
+      <p:grpSp>
+        <p:nvGrpSpPr>
+          <p:cNvPr id="31" name="Group 30">
+            <a:extLst>
+              <a:ext uri="{FF2B5EF4-FFF2-40B4-BE49-F238E27FC236}">
+                <a16:creationId xmlns:a16="http://schemas.microsoft.com/office/drawing/2014/main" id="{C0F56029-4A97-4854-9449-F638D47F8690}"/>
+              </a:ext>
+            </a:extLst>
+          </p:cNvPr>
+          <p:cNvGrpSpPr/>
+          <p:nvPr/>
+        </p:nvGrpSpPr>
+        <p:grpSpPr>
+          <a:xfrm>
+            <a:off x="7097486" y="3516897"/>
+            <a:ext cx="2740423" cy="1724928"/>
+            <a:chOff x="6096000" y="5013760"/>
+            <a:chExt cx="2740423" cy="1724928"/>
+          </a:xfrm>
+        </p:grpSpPr>
+        <p:sp>
+          <p:nvSpPr>
+            <p:cNvPr id="18" name="Flowchart: Magnetic Disk 17">
+              <a:extLst>
+                <a:ext uri="{FF2B5EF4-FFF2-40B4-BE49-F238E27FC236}">
+                  <a16:creationId xmlns:a16="http://schemas.microsoft.com/office/drawing/2014/main" id="{0D27440D-9F17-49F3-B8F3-B3D96303128C}"/>
+                </a:ext>
+              </a:extLst>
+            </p:cNvPr>
+            <p:cNvSpPr/>
+            <p:nvPr/>
+          </p:nvSpPr>
+          <p:spPr>
+            <a:xfrm>
+              <a:off x="6096000" y="5013760"/>
+              <a:ext cx="2740423" cy="1724928"/>
+            </a:xfrm>
+            <a:prstGeom prst="flowChartMagneticDisk">
+              <a:avLst/>
+            </a:prstGeom>
+            <a:solidFill>
+              <a:schemeClr val="accent1">
+                <a:lumMod val="40000"/>
+                <a:lumOff val="60000"/>
+              </a:schemeClr>
+            </a:solidFill>
+          </p:spPr>
+          <p:style>
+            <a:lnRef idx="2">
+              <a:schemeClr val="accent1">
+                <a:shade val="50000"/>
+              </a:schemeClr>
+            </a:lnRef>
+            <a:fillRef idx="1">
+              <a:schemeClr val="accent1"/>
+            </a:fillRef>
+            <a:effectRef idx="0">
+              <a:schemeClr val="accent1"/>
+            </a:effectRef>
+            <a:fontRef idx="minor">
+              <a:schemeClr val="lt1"/>
+            </a:fontRef>
+          </p:style>
+          <p:txBody>
+            <a:bodyPr rtlCol="0" anchor="ctr"/>
+            <a:lstStyle/>
+            <a:p>
+              <a:pPr algn="ctr"/>
+              <a:endParaRPr lang="en-US"/>
+            </a:p>
+          </p:txBody>
+        </p:sp>
+        <p:sp>
+          <p:nvSpPr>
+            <p:cNvPr id="19" name="Content Placeholder 2">
+              <a:extLst>
+                <a:ext uri="{FF2B5EF4-FFF2-40B4-BE49-F238E27FC236}">
+                  <a16:creationId xmlns:a16="http://schemas.microsoft.com/office/drawing/2014/main" id="{4EBFD034-9CAD-4208-B18B-EC91728A630C}"/>
+                </a:ext>
+              </a:extLst>
+            </p:cNvPr>
+            <p:cNvSpPr txBox="1">
+              <a:spLocks/>
+            </p:cNvSpPr>
+            <p:nvPr/>
+          </p:nvSpPr>
+          <p:spPr>
+            <a:xfrm>
+              <a:off x="6096000" y="5638466"/>
+              <a:ext cx="2740423" cy="646848"/>
+            </a:xfrm>
+            <a:prstGeom prst="rect">
+              <a:avLst/>
+            </a:prstGeom>
+          </p:spPr>
+          <p:txBody>
+            <a:bodyPr vert="horz" lIns="91440" tIns="45720" rIns="91440" bIns="45720" rtlCol="0">
+              <a:normAutofit/>
+            </a:bodyPr>
+            <a:lstStyle>
+              <a:lvl1pPr marL="228600" indent="-228600" algn="l" defTabSz="914400" rtl="0" eaLnBrk="1" latinLnBrk="0" hangingPunct="1">
+                <a:lnSpc>
+                  <a:spcPct val="90000"/>
+                </a:lnSpc>
+                <a:spcBef>
+                  <a:spcPts val="1000"/>
+                </a:spcBef>
+                <a:buFont typeface="Arial" panose="020B0604020202020204" pitchFamily="34" charset="0"/>
+                <a:buChar char="•"/>
+                <a:defRPr sz="2800" kern="1200">
+                  <a:solidFill>
+                    <a:schemeClr val="tx1"/>
+                  </a:solidFill>
+                  <a:latin typeface="+mn-lt"/>
+                  <a:ea typeface="+mn-ea"/>
+                  <a:cs typeface="+mn-cs"/>
+                </a:defRPr>
+              </a:lvl1pPr>
+              <a:lvl2pPr marL="685800" indent="-228600" algn="l" defTabSz="914400" rtl="0" eaLnBrk="1" latinLnBrk="0" hangingPunct="1">
+                <a:lnSpc>
+                  <a:spcPct val="90000"/>
+                </a:lnSpc>
+                <a:spcBef>
+                  <a:spcPts val="500"/>
+                </a:spcBef>
+                <a:buFont typeface="Arial" panose="020B0604020202020204" pitchFamily="34" charset="0"/>
+                <a:buChar char="•"/>
+                <a:defRPr sz="2400" kern="1200">
+                  <a:solidFill>
+                    <a:schemeClr val="tx1"/>
+                  </a:solidFill>
+                  <a:latin typeface="+mn-lt"/>
+                  <a:ea typeface="+mn-ea"/>
+                  <a:cs typeface="+mn-cs"/>
+                </a:defRPr>
+              </a:lvl2pPr>
+              <a:lvl3pPr marL="1143000" indent="-228600" algn="l" defTabSz="914400" rtl="0" eaLnBrk="1" latinLnBrk="0" hangingPunct="1">
+                <a:lnSpc>
+                  <a:spcPct val="90000"/>
+                </a:lnSpc>
+                <a:spcBef>
+                  <a:spcPts val="500"/>
+                </a:spcBef>
+                <a:buFont typeface="Arial" panose="020B0604020202020204" pitchFamily="34" charset="0"/>
+                <a:buChar char="•"/>
+                <a:defRPr sz="2000" kern="1200">
+                  <a:solidFill>
+                    <a:schemeClr val="tx1"/>
+                  </a:solidFill>
+                  <a:latin typeface="+mn-lt"/>
+                  <a:ea typeface="+mn-ea"/>
+                  <a:cs typeface="+mn-cs"/>
+                </a:defRPr>
+              </a:lvl3pPr>
+              <a:lvl4pPr marL="1600200" indent="-228600" algn="l" defTabSz="914400" rtl="0" eaLnBrk="1" latinLnBrk="0" hangingPunct="1">
+                <a:lnSpc>
+                  <a:spcPct val="90000"/>
+                </a:lnSpc>
+                <a:spcBef>
+                  <a:spcPts val="500"/>
+                </a:spcBef>
+                <a:buFont typeface="Arial" panose="020B0604020202020204" pitchFamily="34" charset="0"/>
+                <a:buChar char="•"/>
+                <a:defRPr sz="1800" kern="1200">
+                  <a:solidFill>
+                    <a:schemeClr val="tx1"/>
+                  </a:solidFill>
+                  <a:latin typeface="+mn-lt"/>
+                  <a:ea typeface="+mn-ea"/>
+                  <a:cs typeface="+mn-cs"/>
+                </a:defRPr>
+              </a:lvl4pPr>
+              <a:lvl5pPr marL="2057400" indent="-228600" algn="l" defTabSz="914400" rtl="0" eaLnBrk="1" latinLnBrk="0" hangingPunct="1">
+                <a:lnSpc>
+                  <a:spcPct val="90000"/>
+                </a:lnSpc>
+                <a:spcBef>
+                  <a:spcPts val="500"/>
+                </a:spcBef>
+                <a:buFont typeface="Arial" panose="020B0604020202020204" pitchFamily="34" charset="0"/>
+                <a:buChar char="•"/>
+                <a:defRPr sz="1800" kern="1200">
+                  <a:solidFill>
+                    <a:schemeClr val="tx1"/>
+                  </a:solidFill>
+                  <a:latin typeface="+mn-lt"/>
+                  <a:ea typeface="+mn-ea"/>
+                  <a:cs typeface="+mn-cs"/>
+                </a:defRPr>
+              </a:lvl5pPr>
+              <a:lvl6pPr marL="2514600" indent="-228600" algn="l" defTabSz="914400" rtl="0" eaLnBrk="1" latinLnBrk="0" hangingPunct="1">
+                <a:lnSpc>
+                  <a:spcPct val="90000"/>
+                </a:lnSpc>
+                <a:spcBef>
+                  <a:spcPts val="500"/>
+                </a:spcBef>
+                <a:buFont typeface="Arial" panose="020B0604020202020204" pitchFamily="34" charset="0"/>
+                <a:buChar char="•"/>
+                <a:defRPr sz="1800" kern="1200">
+                  <a:solidFill>
+                    <a:schemeClr val="tx1"/>
+                  </a:solidFill>
+                  <a:latin typeface="+mn-lt"/>
+                  <a:ea typeface="+mn-ea"/>
+                  <a:cs typeface="+mn-cs"/>
+                </a:defRPr>
+              </a:lvl6pPr>
+              <a:lvl7pPr marL="2971800" indent="-228600" algn="l" defTabSz="914400" rtl="0" eaLnBrk="1" latinLnBrk="0" hangingPunct="1">
+                <a:lnSpc>
+                  <a:spcPct val="90000"/>
+                </a:lnSpc>
+                <a:spcBef>
+                  <a:spcPts val="500"/>
+                </a:spcBef>
+                <a:buFont typeface="Arial" panose="020B0604020202020204" pitchFamily="34" charset="0"/>
+                <a:buChar char="•"/>
+                <a:defRPr sz="1800" kern="1200">
+                  <a:solidFill>
+                    <a:schemeClr val="tx1"/>
+                  </a:solidFill>
+                  <a:latin typeface="+mn-lt"/>
+                  <a:ea typeface="+mn-ea"/>
+                  <a:cs typeface="+mn-cs"/>
+                </a:defRPr>
+              </a:lvl7pPr>
+              <a:lvl8pPr marL="3429000" indent="-228600" algn="l" defTabSz="914400" rtl="0" eaLnBrk="1" latinLnBrk="0" hangingPunct="1">
+                <a:lnSpc>
+                  <a:spcPct val="90000"/>
+                </a:lnSpc>
+                <a:spcBef>
+                  <a:spcPts val="500"/>
+                </a:spcBef>
+                <a:buFont typeface="Arial" panose="020B0604020202020204" pitchFamily="34" charset="0"/>
+                <a:buChar char="•"/>
+                <a:defRPr sz="1800" kern="1200">
+                  <a:solidFill>
+                    <a:schemeClr val="tx1"/>
+                  </a:solidFill>
+                  <a:latin typeface="+mn-lt"/>
+                  <a:ea typeface="+mn-ea"/>
+                  <a:cs typeface="+mn-cs"/>
+                </a:defRPr>
+              </a:lvl8pPr>
+              <a:lvl9pPr marL="3886200" indent="-228600" algn="l" defTabSz="914400" rtl="0" eaLnBrk="1" latinLnBrk="0" hangingPunct="1">
+                <a:lnSpc>
+                  <a:spcPct val="90000"/>
+                </a:lnSpc>
+                <a:spcBef>
+                  <a:spcPts val="500"/>
+                </a:spcBef>
+                <a:buFont typeface="Arial" panose="020B0604020202020204" pitchFamily="34" charset="0"/>
+                <a:buChar char="•"/>
+                <a:defRPr sz="1800" kern="1200">
+                  <a:solidFill>
+                    <a:schemeClr val="tx1"/>
+                  </a:solidFill>
+                  <a:latin typeface="+mn-lt"/>
+                  <a:ea typeface="+mn-ea"/>
+                  <a:cs typeface="+mn-cs"/>
+                </a:defRPr>
+              </a:lvl9pPr>
+            </a:lstStyle>
+            <a:p>
+              <a:pPr marL="0" indent="0" algn="ctr">
+                <a:buFont typeface="Arial" panose="020B0604020202020204" pitchFamily="34" charset="0"/>
+                <a:buNone/>
+              </a:pPr>
+              <a:r>
+                <a:rPr lang="en-US" b="1">
+                  <a:solidFill>
+                    <a:schemeClr val="bg1"/>
+                  </a:solidFill>
+                  <a:latin typeface="Segoe UI Emoji" panose="020B0502040204020203" pitchFamily="34" charset="0"/>
+                  <a:ea typeface="Segoe UI Emoji" panose="020B0502040204020203" pitchFamily="34" charset="0"/>
+                </a:rPr>
+                <a:t>Data Warehouse</a:t>
+              </a:r>
+              <a:endParaRPr lang="en-US" b="1" dirty="0">
+                <a:solidFill>
+                  <a:schemeClr val="bg1"/>
+                </a:solidFill>
+                <a:latin typeface="Segoe UI Emoji" panose="020B0502040204020203" pitchFamily="34" charset="0"/>
+                <a:ea typeface="Segoe UI Emoji" panose="020B0502040204020203" pitchFamily="34" charset="0"/>
+              </a:endParaRPr>
+            </a:p>
+          </p:txBody>
+        </p:sp>
+      </p:grpSp>
+      <p:cxnSp>
+        <p:nvCxnSpPr>
+          <p:cNvPr id="20" name="Straight Arrow Connector 19">
+            <a:extLst>
+              <a:ext uri="{FF2B5EF4-FFF2-40B4-BE49-F238E27FC236}">
+                <a16:creationId xmlns:a16="http://schemas.microsoft.com/office/drawing/2014/main" id="{86783C2B-7090-4F8C-82D8-3B5D83C7F19E}"/>
+              </a:ext>
+            </a:extLst>
+          </p:cNvPr>
+          <p:cNvCxnSpPr>
+            <a:cxnSpLocks/>
+            <a:stCxn id="18" idx="1"/>
+          </p:cNvCxnSpPr>
+          <p:nvPr/>
+        </p:nvCxnSpPr>
+        <p:spPr>
+          <a:xfrm flipH="1" flipV="1">
+            <a:off x="6395668" y="2863905"/>
+            <a:ext cx="2072030" cy="652992"/>
+          </a:xfrm>
+          <a:prstGeom prst="straightConnector1">
+            <a:avLst/>
+          </a:prstGeom>
+          <a:ln w="19050">
+            <a:solidFill>
+              <a:schemeClr val="tx1"/>
+            </a:solidFill>
+            <a:prstDash val="dash"/>
+            <a:headEnd type="triangle"/>
+            <a:tailEnd type="triangle"/>
+          </a:ln>
+        </p:spPr>
+        <p:style>
+          <a:lnRef idx="1">
+            <a:schemeClr val="accent1"/>
+          </a:lnRef>
+          <a:fillRef idx="0">
+            <a:schemeClr val="accent1"/>
+          </a:fillRef>
+          <a:effectRef idx="0">
+            <a:schemeClr val="accent1"/>
+          </a:effectRef>
+          <a:fontRef idx="minor">
+            <a:schemeClr val="tx1"/>
+          </a:fontRef>
+        </p:style>
+      </p:cxnSp>
+      <p:pic>
+        <p:nvPicPr>
+          <p:cNvPr id="35" name="Picture 34" descr="A cat sitting on a table&#10;&#10;Description generated with high confidence">
+            <a:extLst>
+              <a:ext uri="{FF2B5EF4-FFF2-40B4-BE49-F238E27FC236}">
+                <a16:creationId xmlns:a16="http://schemas.microsoft.com/office/drawing/2014/main" id="{3294799A-3DD9-4A1C-844B-97BA9890A960}"/>
+              </a:ext>
+            </a:extLst>
+          </p:cNvPr>
+          <p:cNvPicPr>
+            <a:picLocks noChangeAspect="1"/>
+          </p:cNvPicPr>
+          <p:nvPr/>
+        </p:nvPicPr>
+        <p:blipFill>
+          <a:blip r:embed="rId5">
+            <a:extLst>
+              <a:ext uri="{28A0092B-C50C-407E-A947-70E740481C1C}">
+                <a14:useLocalDpi xmlns:a14="http://schemas.microsoft.com/office/drawing/2010/main" val="0"/>
+              </a:ext>
+            </a:extLst>
+          </a:blip>
+          <a:stretch>
+            <a:fillRect/>
+          </a:stretch>
+        </p:blipFill>
+        <p:spPr>
+          <a:xfrm>
+            <a:off x="4449536" y="-1691310"/>
+            <a:ext cx="2647950" cy="1724025"/>
+          </a:xfrm>
+          <a:prstGeom prst="ellipse">
+            <a:avLst/>
+          </a:prstGeom>
+          <a:ln w="63500" cap="rnd">
+            <a:noFill/>
+          </a:ln>
+          <a:effectLst>
+            <a:outerShdw blurRad="381000" dist="292100" dir="5400000" sx="-80000" sy="-18000" rotWithShape="0">
+              <a:srgbClr val="000000">
+                <a:alpha val="22000"/>
+              </a:srgbClr>
+            </a:outerShdw>
+          </a:effectLst>
+          <a:scene3d>
+            <a:camera prst="orthographicFront"/>
+            <a:lightRig rig="contrasting" dir="t">
+              <a:rot lat="0" lon="0" rev="3000000"/>
+            </a:lightRig>
+          </a:scene3d>
+          <a:sp3d contourW="7620">
+            <a:bevelT w="95250" h="31750"/>
+            <a:contourClr>
+              <a:srgbClr val="333333"/>
+            </a:contourClr>
+          </a:sp3d>
+        </p:spPr>
+      </p:pic>
+      <p:cxnSp>
+        <p:nvCxnSpPr>
+          <p:cNvPr id="42" name="Straight Arrow Connector 41">
+            <a:extLst>
+              <a:ext uri="{FF2B5EF4-FFF2-40B4-BE49-F238E27FC236}">
+                <a16:creationId xmlns:a16="http://schemas.microsoft.com/office/drawing/2014/main" id="{54E6A325-B1E9-433A-B530-C6F02D9F2ABE}"/>
+              </a:ext>
+            </a:extLst>
+          </p:cNvPr>
+          <p:cNvCxnSpPr>
+            <a:cxnSpLocks/>
+            <a:stCxn id="16" idx="0"/>
+            <a:endCxn id="35" idx="4"/>
+          </p:cNvCxnSpPr>
+          <p:nvPr/>
+        </p:nvCxnSpPr>
+        <p:spPr>
+          <a:xfrm flipH="1" flipV="1">
+            <a:off x="5773511" y="32715"/>
+            <a:ext cx="22822" cy="1493836"/>
+          </a:xfrm>
+          <a:prstGeom prst="straightConnector1">
+            <a:avLst/>
+          </a:prstGeom>
+          <a:ln w="19050">
+            <a:solidFill>
+              <a:schemeClr val="tx1"/>
+            </a:solidFill>
+            <a:prstDash val="dash"/>
+            <a:headEnd type="triangle"/>
+            <a:tailEnd type="triangle"/>
+          </a:ln>
+        </p:spPr>
+        <p:style>
+          <a:lnRef idx="1">
+            <a:schemeClr val="accent1"/>
+          </a:lnRef>
+          <a:fillRef idx="0">
+            <a:schemeClr val="accent1"/>
+          </a:fillRef>
+          <a:effectRef idx="0">
+            <a:schemeClr val="accent1"/>
+          </a:effectRef>
+          <a:fontRef idx="minor">
+            <a:schemeClr val="tx1"/>
+          </a:fontRef>
+        </p:style>
+      </p:cxnSp>
+      <p:sp>
+        <p:nvSpPr>
+          <p:cNvPr id="36" name="Rectangle 35">
+            <a:extLst>
+              <a:ext uri="{FF2B5EF4-FFF2-40B4-BE49-F238E27FC236}">
+                <a16:creationId xmlns:a16="http://schemas.microsoft.com/office/drawing/2014/main" id="{8725F300-8FA2-4F52-8989-1E3A192F5F6F}"/>
+              </a:ext>
+            </a:extLst>
+          </p:cNvPr>
+          <p:cNvSpPr/>
+          <p:nvPr/>
+        </p:nvSpPr>
+        <p:spPr>
+          <a:xfrm>
+            <a:off x="1060067" y="214346"/>
+            <a:ext cx="10014857" cy="967259"/>
+          </a:xfrm>
+          <a:prstGeom prst="rect">
+            <a:avLst/>
+          </a:prstGeom>
+          <a:solidFill>
+            <a:schemeClr val="accent2">
+              <a:lumMod val="60000"/>
+              <a:lumOff val="40000"/>
+              <a:alpha val="90000"/>
+            </a:schemeClr>
+          </a:solidFill>
+        </p:spPr>
+        <p:style>
+          <a:lnRef idx="2">
+            <a:schemeClr val="accent1">
+              <a:shade val="50000"/>
+            </a:schemeClr>
+          </a:lnRef>
+          <a:fillRef idx="1">
+            <a:schemeClr val="accent1"/>
+          </a:fillRef>
+          <a:effectRef idx="0">
+            <a:schemeClr val="accent1"/>
+          </a:effectRef>
+          <a:fontRef idx="minor">
+            <a:schemeClr val="lt1"/>
+          </a:fontRef>
+        </p:style>
+        <p:txBody>
+          <a:bodyPr rtlCol="0" anchor="ctr"/>
+          <a:lstStyle/>
+          <a:p>
+            <a:pPr algn="ctr"/>
+            <a:r>
+              <a:rPr lang="en-US" sz="2800" dirty="0">
+                <a:latin typeface="Segoe UI Emoji" panose="020B0502040204020203" pitchFamily="34" charset="0"/>
+                <a:ea typeface="Segoe UI Emoji" panose="020B0502040204020203" pitchFamily="34" charset="0"/>
+              </a:rPr>
+              <a:t>DMZ/Perimeter Network</a:t>
+            </a:r>
+          </a:p>
+        </p:txBody>
+      </p:sp>
+    </p:spTree>
+    <p:extLst>
+      <p:ext uri="{BB962C8B-B14F-4D97-AF65-F5344CB8AC3E}">
+        <p14:creationId xmlns:p14="http://schemas.microsoft.com/office/powerpoint/2010/main" val="88691768"/>
+      </p:ext>
+    </p:extLst>
+  </p:cSld>
+  <p:clrMapOvr>
+    <a:masterClrMapping/>
+  </p:clrMapOvr>
+</p:sld>
+</file>
+
+<file path=ppt/slides/slide3.xml><?xml version="1.0" encoding="utf-8"?>
+<p:sld xmlns:a="http://schemas.openxmlformats.org/drawingml/2006/main" xmlns:r="http://schemas.openxmlformats.org/officeDocument/2006/relationships" xmlns:p="http://schemas.openxmlformats.org/presentationml/2006/main">
+  <p:cSld>
+    <p:spTree>
+      <p:nvGrpSpPr>
+        <p:cNvPr id="1" name=""/>
+        <p:cNvGrpSpPr/>
+        <p:nvPr/>
+      </p:nvGrpSpPr>
+      <p:grpSpPr>
+        <a:xfrm>
+          <a:off x="0" y="0"/>
+          <a:ext cx="0" cy="0"/>
+          <a:chOff x="0" y="0"/>
+          <a:chExt cx="0" cy="0"/>
+        </a:xfrm>
+      </p:grpSpPr>
+      <p:pic>
+        <p:nvPicPr>
+          <p:cNvPr id="30" name="Picture 29" descr="A close up of a logo&#10;&#10;Description generated with high confidence">
+            <a:extLst>
+              <a:ext uri="{FF2B5EF4-FFF2-40B4-BE49-F238E27FC236}">
+                <a16:creationId xmlns:a16="http://schemas.microsoft.com/office/drawing/2014/main" id="{3E2B6E0F-C632-4EF9-B48F-FB67B1A6DE61}"/>
+              </a:ext>
+            </a:extLst>
+          </p:cNvPr>
+          <p:cNvPicPr>
+            <a:picLocks noChangeAspect="1"/>
+          </p:cNvPicPr>
+          <p:nvPr/>
+        </p:nvPicPr>
+        <p:blipFill>
+          <a:blip r:embed="rId2">
+            <a:duotone>
+              <a:prstClr val="black"/>
+              <a:srgbClr val="000000">
+                <a:alpha val="50196"/>
+                <a:tint val="45000"/>
+                <a:satMod val="400000"/>
+              </a:srgbClr>
+            </a:duotone>
+            <a:extLst>
+              <a:ext uri="{28A0092B-C50C-407E-A947-70E740481C1C}">
+                <a14:useLocalDpi xmlns:a14="http://schemas.microsoft.com/office/drawing/2010/main" val="0"/>
+              </a:ext>
+            </a:extLst>
+          </a:blip>
+          <a:stretch>
+            <a:fillRect/>
+          </a:stretch>
+        </p:blipFill>
+        <p:spPr>
+          <a:xfrm>
+            <a:off x="677168" y="175794"/>
+            <a:ext cx="10296156" cy="6682206"/>
+          </a:xfrm>
+          <a:prstGeom prst="rect">
+            <a:avLst/>
+          </a:prstGeom>
+          <a:effectLst>
+            <a:softEdge rad="76200"/>
+          </a:effectLst>
+        </p:spPr>
+      </p:pic>
+      <p:sp>
+        <p:nvSpPr>
+          <p:cNvPr id="4" name="Flowchart: Magnetic Disk 3">
+            <a:extLst>
+              <a:ext uri="{FF2B5EF4-FFF2-40B4-BE49-F238E27FC236}">
+                <a16:creationId xmlns:a16="http://schemas.microsoft.com/office/drawing/2014/main" id="{CF5837E7-8D9B-479E-9B4E-F8097E21FB00}"/>
+              </a:ext>
+            </a:extLst>
+          </p:cNvPr>
+          <p:cNvSpPr/>
+          <p:nvPr/>
+        </p:nvSpPr>
+        <p:spPr>
+          <a:xfrm>
+            <a:off x="1648236" y="3602563"/>
+            <a:ext cx="2740423" cy="1724928"/>
+          </a:xfrm>
+          <a:prstGeom prst="flowChartMagneticDisk">
+            <a:avLst/>
+          </a:prstGeom>
+          <a:solidFill>
+            <a:schemeClr val="accent1">
+              <a:lumMod val="40000"/>
+              <a:lumOff val="60000"/>
+            </a:schemeClr>
+          </a:solidFill>
+          <a:ln>
+            <a:solidFill>
+              <a:schemeClr val="tx1"/>
+            </a:solidFill>
+          </a:ln>
+        </p:spPr>
+        <p:style>
+          <a:lnRef idx="2">
+            <a:schemeClr val="accent1">
+              <a:shade val="50000"/>
+            </a:schemeClr>
+          </a:lnRef>
+          <a:fillRef idx="1">
+            <a:schemeClr val="accent1"/>
+          </a:fillRef>
+          <a:effectRef idx="0">
+            <a:schemeClr val="accent1"/>
+          </a:effectRef>
+          <a:fontRef idx="minor">
+            <a:schemeClr val="lt1"/>
+          </a:fontRef>
+        </p:style>
+        <p:txBody>
+          <a:bodyPr rtlCol="0" anchor="ctr"/>
+          <a:lstStyle/>
+          <a:p>
+            <a:pPr algn="ctr"/>
+            <a:endParaRPr lang="en-US" dirty="0"/>
+          </a:p>
+        </p:txBody>
+      </p:sp>
+      <p:sp>
+        <p:nvSpPr>
+          <p:cNvPr id="3" name="Content Placeholder 2">
+            <a:extLst>
+              <a:ext uri="{FF2B5EF4-FFF2-40B4-BE49-F238E27FC236}">
+                <a16:creationId xmlns:a16="http://schemas.microsoft.com/office/drawing/2014/main" id="{1CDFE8F8-4A3D-4967-88EB-B3054A135728}"/>
+              </a:ext>
+            </a:extLst>
+          </p:cNvPr>
+          <p:cNvSpPr>
+            <a:spLocks noGrp="1"/>
+          </p:cNvSpPr>
+          <p:nvPr>
+            <p:ph idx="1"/>
+          </p:nvPr>
+        </p:nvSpPr>
+        <p:spPr>
+          <a:xfrm>
+            <a:off x="1648236" y="4292455"/>
+            <a:ext cx="2740423" cy="646848"/>
+          </a:xfrm>
+        </p:spPr>
+        <p:txBody>
+          <a:bodyPr>
+            <a:normAutofit/>
+          </a:bodyPr>
+          <a:lstStyle/>
+          <a:p>
+            <a:pPr marL="0" indent="0" algn="ctr">
+              <a:buNone/>
+            </a:pPr>
+            <a:r>
+              <a:rPr lang="en-US" b="1" dirty="0">
+                <a:solidFill>
+                  <a:schemeClr val="bg1"/>
+                </a:solidFill>
+                <a:latin typeface="Segoe UI Emoji" panose="020B0502040204020203" pitchFamily="34" charset="0"/>
+                <a:ea typeface="Segoe UI Emoji" panose="020B0502040204020203" pitchFamily="34" charset="0"/>
+              </a:rPr>
+              <a:t>Data Warehouse</a:t>
+            </a:r>
+          </a:p>
+        </p:txBody>
+      </p:sp>
+      <p:grpSp>
+        <p:nvGrpSpPr>
+          <p:cNvPr id="23" name="Group 22">
+            <a:extLst>
+              <a:ext uri="{FF2B5EF4-FFF2-40B4-BE49-F238E27FC236}">
+                <a16:creationId xmlns:a16="http://schemas.microsoft.com/office/drawing/2014/main" id="{EA2F3111-1AB7-4265-9BAF-C77FCAFFDCE2}"/>
+              </a:ext>
+            </a:extLst>
+          </p:cNvPr>
+          <p:cNvGrpSpPr/>
+          <p:nvPr/>
+        </p:nvGrpSpPr>
+        <p:grpSpPr>
+          <a:xfrm>
+            <a:off x="4324522" y="3576553"/>
+            <a:ext cx="2740423" cy="1724928"/>
+            <a:chOff x="3898395" y="4836898"/>
+            <a:chExt cx="2740423" cy="1724928"/>
+          </a:xfrm>
+        </p:grpSpPr>
+        <p:sp>
+          <p:nvSpPr>
+            <p:cNvPr id="5" name="Flowchart: Magnetic Disk 4">
+              <a:extLst>
+                <a:ext uri="{FF2B5EF4-FFF2-40B4-BE49-F238E27FC236}">
+                  <a16:creationId xmlns:a16="http://schemas.microsoft.com/office/drawing/2014/main" id="{305B5DAE-7DFD-435E-8642-F642D328D24F}"/>
+                </a:ext>
+              </a:extLst>
+            </p:cNvPr>
+            <p:cNvSpPr/>
+            <p:nvPr/>
+          </p:nvSpPr>
+          <p:spPr>
+            <a:xfrm>
+              <a:off x="3898395" y="4836898"/>
+              <a:ext cx="2740423" cy="1724928"/>
+            </a:xfrm>
+            <a:prstGeom prst="flowChartMagneticDisk">
+              <a:avLst/>
+            </a:prstGeom>
+            <a:solidFill>
+              <a:schemeClr val="accent1">
+                <a:lumMod val="40000"/>
+                <a:lumOff val="60000"/>
+              </a:schemeClr>
+            </a:solidFill>
+          </p:spPr>
+          <p:style>
+            <a:lnRef idx="2">
+              <a:schemeClr val="accent1">
+                <a:shade val="50000"/>
+              </a:schemeClr>
+            </a:lnRef>
+            <a:fillRef idx="1">
+              <a:schemeClr val="accent1"/>
+            </a:fillRef>
+            <a:effectRef idx="0">
+              <a:schemeClr val="accent1"/>
+            </a:effectRef>
+            <a:fontRef idx="minor">
+              <a:schemeClr val="lt1"/>
+            </a:fontRef>
+          </p:style>
+          <p:txBody>
+            <a:bodyPr rtlCol="0" anchor="ctr"/>
+            <a:lstStyle/>
+            <a:p>
+              <a:pPr algn="ctr"/>
+              <a:endParaRPr lang="en-US"/>
+            </a:p>
+          </p:txBody>
+        </p:sp>
+        <p:sp>
+          <p:nvSpPr>
+            <p:cNvPr id="6" name="Content Placeholder 2">
+              <a:extLst>
+                <a:ext uri="{FF2B5EF4-FFF2-40B4-BE49-F238E27FC236}">
+                  <a16:creationId xmlns:a16="http://schemas.microsoft.com/office/drawing/2014/main" id="{DD33CDA0-2A1C-4D7E-B5A2-DAA7A72092FC}"/>
+                </a:ext>
+              </a:extLst>
+            </p:cNvPr>
+            <p:cNvSpPr txBox="1">
+              <a:spLocks/>
+            </p:cNvSpPr>
+            <p:nvPr/>
+          </p:nvSpPr>
+          <p:spPr>
+            <a:xfrm>
+              <a:off x="3898395" y="5526790"/>
+              <a:ext cx="2740423" cy="646848"/>
+            </a:xfrm>
+            <a:prstGeom prst="rect">
+              <a:avLst/>
+            </a:prstGeom>
+          </p:spPr>
+          <p:txBody>
+            <a:bodyPr vert="horz" lIns="91440" tIns="45720" rIns="91440" bIns="45720" rtlCol="0">
+              <a:normAutofit/>
+            </a:bodyPr>
+            <a:lstStyle>
+              <a:lvl1pPr marL="228600" indent="-228600" algn="l" defTabSz="914400" rtl="0" eaLnBrk="1" latinLnBrk="0" hangingPunct="1">
+                <a:lnSpc>
+                  <a:spcPct val="90000"/>
+                </a:lnSpc>
+                <a:spcBef>
+                  <a:spcPts val="1000"/>
+                </a:spcBef>
+                <a:buFont typeface="Arial" panose="020B0604020202020204" pitchFamily="34" charset="0"/>
+                <a:buChar char="•"/>
+                <a:defRPr sz="2800" kern="1200">
+                  <a:solidFill>
+                    <a:schemeClr val="tx1"/>
+                  </a:solidFill>
+                  <a:latin typeface="+mn-lt"/>
+                  <a:ea typeface="+mn-ea"/>
+                  <a:cs typeface="+mn-cs"/>
+                </a:defRPr>
+              </a:lvl1pPr>
+              <a:lvl2pPr marL="685800" indent="-228600" algn="l" defTabSz="914400" rtl="0" eaLnBrk="1" latinLnBrk="0" hangingPunct="1">
+                <a:lnSpc>
+                  <a:spcPct val="90000"/>
+                </a:lnSpc>
+                <a:spcBef>
+                  <a:spcPts val="500"/>
+                </a:spcBef>
+                <a:buFont typeface="Arial" panose="020B0604020202020204" pitchFamily="34" charset="0"/>
+                <a:buChar char="•"/>
+                <a:defRPr sz="2400" kern="1200">
+                  <a:solidFill>
+                    <a:schemeClr val="tx1"/>
+                  </a:solidFill>
+                  <a:latin typeface="+mn-lt"/>
+                  <a:ea typeface="+mn-ea"/>
+                  <a:cs typeface="+mn-cs"/>
+                </a:defRPr>
+              </a:lvl2pPr>
+              <a:lvl3pPr marL="1143000" indent="-228600" algn="l" defTabSz="914400" rtl="0" eaLnBrk="1" latinLnBrk="0" hangingPunct="1">
+                <a:lnSpc>
+                  <a:spcPct val="90000"/>
+                </a:lnSpc>
+                <a:spcBef>
+                  <a:spcPts val="500"/>
+                </a:spcBef>
+                <a:buFont typeface="Arial" panose="020B0604020202020204" pitchFamily="34" charset="0"/>
+                <a:buChar char="•"/>
+                <a:defRPr sz="2000" kern="1200">
+                  <a:solidFill>
+                    <a:schemeClr val="tx1"/>
+                  </a:solidFill>
+                  <a:latin typeface="+mn-lt"/>
+                  <a:ea typeface="+mn-ea"/>
+                  <a:cs typeface="+mn-cs"/>
+                </a:defRPr>
+              </a:lvl3pPr>
+              <a:lvl4pPr marL="1600200" indent="-228600" algn="l" defTabSz="914400" rtl="0" eaLnBrk="1" latinLnBrk="0" hangingPunct="1">
+                <a:lnSpc>
+                  <a:spcPct val="90000"/>
+                </a:lnSpc>
+                <a:spcBef>
+                  <a:spcPts val="500"/>
+                </a:spcBef>
+                <a:buFont typeface="Arial" panose="020B0604020202020204" pitchFamily="34" charset="0"/>
+                <a:buChar char="•"/>
+                <a:defRPr sz="1800" kern="1200">
+                  <a:solidFill>
+                    <a:schemeClr val="tx1"/>
+                  </a:solidFill>
+                  <a:latin typeface="+mn-lt"/>
+                  <a:ea typeface="+mn-ea"/>
+                  <a:cs typeface="+mn-cs"/>
+                </a:defRPr>
+              </a:lvl4pPr>
+              <a:lvl5pPr marL="2057400" indent="-228600" algn="l" defTabSz="914400" rtl="0" eaLnBrk="1" latinLnBrk="0" hangingPunct="1">
+                <a:lnSpc>
+                  <a:spcPct val="90000"/>
+                </a:lnSpc>
+                <a:spcBef>
+                  <a:spcPts val="500"/>
+                </a:spcBef>
+                <a:buFont typeface="Arial" panose="020B0604020202020204" pitchFamily="34" charset="0"/>
+                <a:buChar char="•"/>
+                <a:defRPr sz="1800" kern="1200">
+                  <a:solidFill>
+                    <a:schemeClr val="tx1"/>
+                  </a:solidFill>
+                  <a:latin typeface="+mn-lt"/>
+                  <a:ea typeface="+mn-ea"/>
+                  <a:cs typeface="+mn-cs"/>
+                </a:defRPr>
+              </a:lvl5pPr>
+              <a:lvl6pPr marL="2514600" indent="-228600" algn="l" defTabSz="914400" rtl="0" eaLnBrk="1" latinLnBrk="0" hangingPunct="1">
+                <a:lnSpc>
+                  <a:spcPct val="90000"/>
+                </a:lnSpc>
+                <a:spcBef>
+                  <a:spcPts val="500"/>
+                </a:spcBef>
+                <a:buFont typeface="Arial" panose="020B0604020202020204" pitchFamily="34" charset="0"/>
+                <a:buChar char="•"/>
+                <a:defRPr sz="1800" kern="1200">
+                  <a:solidFill>
+                    <a:schemeClr val="tx1"/>
+                  </a:solidFill>
+                  <a:latin typeface="+mn-lt"/>
+                  <a:ea typeface="+mn-ea"/>
+                  <a:cs typeface="+mn-cs"/>
+                </a:defRPr>
+              </a:lvl6pPr>
+              <a:lvl7pPr marL="2971800" indent="-228600" algn="l" defTabSz="914400" rtl="0" eaLnBrk="1" latinLnBrk="0" hangingPunct="1">
+                <a:lnSpc>
+                  <a:spcPct val="90000"/>
+                </a:lnSpc>
+                <a:spcBef>
+                  <a:spcPts val="500"/>
+                </a:spcBef>
+                <a:buFont typeface="Arial" panose="020B0604020202020204" pitchFamily="34" charset="0"/>
+                <a:buChar char="•"/>
+                <a:defRPr sz="1800" kern="1200">
+                  <a:solidFill>
+                    <a:schemeClr val="tx1"/>
+                  </a:solidFill>
+                  <a:latin typeface="+mn-lt"/>
+                  <a:ea typeface="+mn-ea"/>
+                  <a:cs typeface="+mn-cs"/>
+                </a:defRPr>
+              </a:lvl7pPr>
+              <a:lvl8pPr marL="3429000" indent="-228600" algn="l" defTabSz="914400" rtl="0" eaLnBrk="1" latinLnBrk="0" hangingPunct="1">
+                <a:lnSpc>
+                  <a:spcPct val="90000"/>
+                </a:lnSpc>
+                <a:spcBef>
+                  <a:spcPts val="500"/>
+                </a:spcBef>
+                <a:buFont typeface="Arial" panose="020B0604020202020204" pitchFamily="34" charset="0"/>
+                <a:buChar char="•"/>
+                <a:defRPr sz="1800" kern="1200">
+                  <a:solidFill>
+                    <a:schemeClr val="tx1"/>
+                  </a:solidFill>
+                  <a:latin typeface="+mn-lt"/>
+                  <a:ea typeface="+mn-ea"/>
+                  <a:cs typeface="+mn-cs"/>
+                </a:defRPr>
+              </a:lvl8pPr>
+              <a:lvl9pPr marL="3886200" indent="-228600" algn="l" defTabSz="914400" rtl="0" eaLnBrk="1" latinLnBrk="0" hangingPunct="1">
+                <a:lnSpc>
+                  <a:spcPct val="90000"/>
+                </a:lnSpc>
+                <a:spcBef>
+                  <a:spcPts val="500"/>
+                </a:spcBef>
+                <a:buFont typeface="Arial" panose="020B0604020202020204" pitchFamily="34" charset="0"/>
+                <a:buChar char="•"/>
+                <a:defRPr sz="1800" kern="1200">
+                  <a:solidFill>
+                    <a:schemeClr val="tx1"/>
+                  </a:solidFill>
+                  <a:latin typeface="+mn-lt"/>
+                  <a:ea typeface="+mn-ea"/>
+                  <a:cs typeface="+mn-cs"/>
+                </a:defRPr>
+              </a:lvl9pPr>
+            </a:lstStyle>
+            <a:p>
+              <a:pPr marL="0" indent="0" algn="ctr">
+                <a:buFont typeface="Arial" panose="020B0604020202020204" pitchFamily="34" charset="0"/>
+                <a:buNone/>
+              </a:pPr>
+              <a:r>
+                <a:rPr lang="en-US" b="1" dirty="0">
+                  <a:solidFill>
+                    <a:schemeClr val="bg1"/>
+                  </a:solidFill>
+                  <a:latin typeface="Segoe UI Emoji" panose="020B0502040204020203" pitchFamily="34" charset="0"/>
+                  <a:ea typeface="Segoe UI Emoji" panose="020B0502040204020203" pitchFamily="34" charset="0"/>
+                </a:rPr>
+                <a:t>Data Warehouse</a:t>
+              </a:r>
+            </a:p>
+          </p:txBody>
+        </p:sp>
+      </p:grpSp>
+      <p:cxnSp>
+        <p:nvCxnSpPr>
+          <p:cNvPr id="8" name="Straight Arrow Connector 7">
+            <a:extLst>
+              <a:ext uri="{FF2B5EF4-FFF2-40B4-BE49-F238E27FC236}">
+                <a16:creationId xmlns:a16="http://schemas.microsoft.com/office/drawing/2014/main" id="{FFA85AEE-3FC7-43E2-AABD-1FC5423D7FA0}"/>
+              </a:ext>
+            </a:extLst>
+          </p:cNvPr>
+          <p:cNvCxnSpPr>
+            <a:cxnSpLocks/>
+            <a:stCxn id="4" idx="1"/>
+            <a:endCxn id="7" idx="3"/>
+          </p:cNvCxnSpPr>
+          <p:nvPr/>
+        </p:nvCxnSpPr>
+        <p:spPr>
+          <a:xfrm flipV="1">
+            <a:off x="3018448" y="-252478"/>
+            <a:ext cx="1740093" cy="3855041"/>
+          </a:xfrm>
+          <a:prstGeom prst="straightConnector1">
+            <a:avLst/>
+          </a:prstGeom>
+          <a:ln w="19050">
+            <a:solidFill>
+              <a:schemeClr val="tx1"/>
+            </a:solidFill>
+            <a:prstDash val="dash"/>
+            <a:headEnd type="triangle"/>
+            <a:tailEnd type="triangle"/>
+          </a:ln>
+        </p:spPr>
+        <p:style>
+          <a:lnRef idx="1">
+            <a:schemeClr val="accent1"/>
+          </a:lnRef>
+          <a:fillRef idx="0">
+            <a:schemeClr val="accent1"/>
+          </a:fillRef>
+          <a:effectRef idx="0">
+            <a:schemeClr val="accent1"/>
+          </a:effectRef>
+          <a:fontRef idx="minor">
+            <a:schemeClr val="tx1"/>
+          </a:fontRef>
+        </p:style>
+      </p:cxnSp>
+      <p:cxnSp>
+        <p:nvCxnSpPr>
+          <p:cNvPr id="11" name="Straight Arrow Connector 10">
+            <a:extLst>
+              <a:ext uri="{FF2B5EF4-FFF2-40B4-BE49-F238E27FC236}">
+                <a16:creationId xmlns:a16="http://schemas.microsoft.com/office/drawing/2014/main" id="{99643EC8-4F43-4877-BC36-C9AEE4D4D6D9}"/>
+              </a:ext>
+            </a:extLst>
+          </p:cNvPr>
+          <p:cNvCxnSpPr>
+            <a:cxnSpLocks/>
+            <a:stCxn id="5" idx="1"/>
+            <a:endCxn id="7" idx="4"/>
+          </p:cNvCxnSpPr>
+          <p:nvPr/>
+        </p:nvCxnSpPr>
+        <p:spPr>
+          <a:xfrm flipH="1" flipV="1">
+            <a:off x="5694733" y="0"/>
+            <a:ext cx="1" cy="3576553"/>
+          </a:xfrm>
+          <a:prstGeom prst="straightConnector1">
+            <a:avLst/>
+          </a:prstGeom>
+          <a:ln w="19050">
+            <a:solidFill>
+              <a:schemeClr val="tx1"/>
+            </a:solidFill>
+            <a:prstDash val="dash"/>
+            <a:headEnd type="triangle"/>
+            <a:tailEnd type="triangle"/>
+          </a:ln>
+        </p:spPr>
+        <p:style>
+          <a:lnRef idx="1">
+            <a:schemeClr val="accent1"/>
+          </a:lnRef>
+          <a:fillRef idx="0">
+            <a:schemeClr val="accent1"/>
+          </a:fillRef>
+          <a:effectRef idx="0">
+            <a:schemeClr val="accent1"/>
+          </a:effectRef>
+          <a:fontRef idx="minor">
+            <a:schemeClr val="tx1"/>
+          </a:fontRef>
+        </p:style>
+      </p:cxnSp>
+      <p:grpSp>
+        <p:nvGrpSpPr>
+          <p:cNvPr id="31" name="Group 30">
+            <a:extLst>
+              <a:ext uri="{FF2B5EF4-FFF2-40B4-BE49-F238E27FC236}">
+                <a16:creationId xmlns:a16="http://schemas.microsoft.com/office/drawing/2014/main" id="{C0F56029-4A97-4854-9449-F638D47F8690}"/>
+              </a:ext>
+            </a:extLst>
+          </p:cNvPr>
+          <p:cNvGrpSpPr/>
+          <p:nvPr/>
+        </p:nvGrpSpPr>
+        <p:grpSpPr>
+          <a:xfrm>
+            <a:off x="6995886" y="3516897"/>
+            <a:ext cx="2740423" cy="1724928"/>
+            <a:chOff x="6096000" y="5013760"/>
+            <a:chExt cx="2740423" cy="1724928"/>
+          </a:xfrm>
+        </p:grpSpPr>
+        <p:sp>
+          <p:nvSpPr>
+            <p:cNvPr id="18" name="Flowchart: Magnetic Disk 17">
+              <a:extLst>
+                <a:ext uri="{FF2B5EF4-FFF2-40B4-BE49-F238E27FC236}">
+                  <a16:creationId xmlns:a16="http://schemas.microsoft.com/office/drawing/2014/main" id="{0D27440D-9F17-49F3-B8F3-B3D96303128C}"/>
+                </a:ext>
+              </a:extLst>
+            </p:cNvPr>
+            <p:cNvSpPr/>
+            <p:nvPr/>
+          </p:nvSpPr>
+          <p:spPr>
+            <a:xfrm>
+              <a:off x="6096000" y="5013760"/>
+              <a:ext cx="2740423" cy="1724928"/>
+            </a:xfrm>
+            <a:prstGeom prst="flowChartMagneticDisk">
+              <a:avLst/>
+            </a:prstGeom>
+            <a:solidFill>
+              <a:schemeClr val="accent1">
+                <a:lumMod val="40000"/>
+                <a:lumOff val="60000"/>
+              </a:schemeClr>
+            </a:solidFill>
+          </p:spPr>
+          <p:style>
+            <a:lnRef idx="2">
+              <a:schemeClr val="accent1">
+                <a:shade val="50000"/>
+              </a:schemeClr>
+            </a:lnRef>
+            <a:fillRef idx="1">
+              <a:schemeClr val="accent1"/>
+            </a:fillRef>
+            <a:effectRef idx="0">
+              <a:schemeClr val="accent1"/>
+            </a:effectRef>
+            <a:fontRef idx="minor">
+              <a:schemeClr val="lt1"/>
+            </a:fontRef>
+          </p:style>
+          <p:txBody>
+            <a:bodyPr rtlCol="0" anchor="ctr"/>
+            <a:lstStyle/>
+            <a:p>
+              <a:pPr algn="ctr"/>
+              <a:endParaRPr lang="en-US"/>
+            </a:p>
+          </p:txBody>
+        </p:sp>
+        <p:sp>
+          <p:nvSpPr>
+            <p:cNvPr id="19" name="Content Placeholder 2">
+              <a:extLst>
+                <a:ext uri="{FF2B5EF4-FFF2-40B4-BE49-F238E27FC236}">
+                  <a16:creationId xmlns:a16="http://schemas.microsoft.com/office/drawing/2014/main" id="{4EBFD034-9CAD-4208-B18B-EC91728A630C}"/>
+                </a:ext>
+              </a:extLst>
+            </p:cNvPr>
+            <p:cNvSpPr txBox="1">
+              <a:spLocks/>
+            </p:cNvSpPr>
+            <p:nvPr/>
+          </p:nvSpPr>
+          <p:spPr>
+            <a:xfrm>
+              <a:off x="6096000" y="5638466"/>
+              <a:ext cx="2740423" cy="646848"/>
+            </a:xfrm>
+            <a:prstGeom prst="rect">
+              <a:avLst/>
+            </a:prstGeom>
+          </p:spPr>
+          <p:txBody>
+            <a:bodyPr vert="horz" lIns="91440" tIns="45720" rIns="91440" bIns="45720" rtlCol="0">
+              <a:normAutofit/>
+            </a:bodyPr>
+            <a:lstStyle>
+              <a:lvl1pPr marL="228600" indent="-228600" algn="l" defTabSz="914400" rtl="0" eaLnBrk="1" latinLnBrk="0" hangingPunct="1">
+                <a:lnSpc>
+                  <a:spcPct val="90000"/>
+                </a:lnSpc>
+                <a:spcBef>
+                  <a:spcPts val="1000"/>
+                </a:spcBef>
+                <a:buFont typeface="Arial" panose="020B0604020202020204" pitchFamily="34" charset="0"/>
+                <a:buChar char="•"/>
+                <a:defRPr sz="2800" kern="1200">
+                  <a:solidFill>
+                    <a:schemeClr val="tx1"/>
+                  </a:solidFill>
+                  <a:latin typeface="+mn-lt"/>
+                  <a:ea typeface="+mn-ea"/>
+                  <a:cs typeface="+mn-cs"/>
+                </a:defRPr>
+              </a:lvl1pPr>
+              <a:lvl2pPr marL="685800" indent="-228600" algn="l" defTabSz="914400" rtl="0" eaLnBrk="1" latinLnBrk="0" hangingPunct="1">
+                <a:lnSpc>
+                  <a:spcPct val="90000"/>
+                </a:lnSpc>
+                <a:spcBef>
+                  <a:spcPts val="500"/>
+                </a:spcBef>
+                <a:buFont typeface="Arial" panose="020B0604020202020204" pitchFamily="34" charset="0"/>
+                <a:buChar char="•"/>
+                <a:defRPr sz="2400" kern="1200">
+                  <a:solidFill>
+                    <a:schemeClr val="tx1"/>
+                  </a:solidFill>
+                  <a:latin typeface="+mn-lt"/>
+                  <a:ea typeface="+mn-ea"/>
+                  <a:cs typeface="+mn-cs"/>
+                </a:defRPr>
+              </a:lvl2pPr>
+              <a:lvl3pPr marL="1143000" indent="-228600" algn="l" defTabSz="914400" rtl="0" eaLnBrk="1" latinLnBrk="0" hangingPunct="1">
+                <a:lnSpc>
+                  <a:spcPct val="90000"/>
+                </a:lnSpc>
+                <a:spcBef>
+                  <a:spcPts val="500"/>
+                </a:spcBef>
+                <a:buFont typeface="Arial" panose="020B0604020202020204" pitchFamily="34" charset="0"/>
+                <a:buChar char="•"/>
+                <a:defRPr sz="2000" kern="1200">
+                  <a:solidFill>
+                    <a:schemeClr val="tx1"/>
+                  </a:solidFill>
+                  <a:latin typeface="+mn-lt"/>
+                  <a:ea typeface="+mn-ea"/>
+                  <a:cs typeface="+mn-cs"/>
+                </a:defRPr>
+              </a:lvl3pPr>
+              <a:lvl4pPr marL="1600200" indent="-228600" algn="l" defTabSz="914400" rtl="0" eaLnBrk="1" latinLnBrk="0" hangingPunct="1">
+                <a:lnSpc>
+                  <a:spcPct val="90000"/>
+                </a:lnSpc>
+                <a:spcBef>
+                  <a:spcPts val="500"/>
+                </a:spcBef>
+                <a:buFont typeface="Arial" panose="020B0604020202020204" pitchFamily="34" charset="0"/>
+                <a:buChar char="•"/>
+                <a:defRPr sz="1800" kern="1200">
+                  <a:solidFill>
+                    <a:schemeClr val="tx1"/>
+                  </a:solidFill>
+                  <a:latin typeface="+mn-lt"/>
+                  <a:ea typeface="+mn-ea"/>
+                  <a:cs typeface="+mn-cs"/>
+                </a:defRPr>
+              </a:lvl4pPr>
+              <a:lvl5pPr marL="2057400" indent="-228600" algn="l" defTabSz="914400" rtl="0" eaLnBrk="1" latinLnBrk="0" hangingPunct="1">
+                <a:lnSpc>
+                  <a:spcPct val="90000"/>
+                </a:lnSpc>
+                <a:spcBef>
+                  <a:spcPts val="500"/>
+                </a:spcBef>
+                <a:buFont typeface="Arial" panose="020B0604020202020204" pitchFamily="34" charset="0"/>
+                <a:buChar char="•"/>
+                <a:defRPr sz="1800" kern="1200">
+                  <a:solidFill>
+                    <a:schemeClr val="tx1"/>
+                  </a:solidFill>
+                  <a:latin typeface="+mn-lt"/>
+                  <a:ea typeface="+mn-ea"/>
+                  <a:cs typeface="+mn-cs"/>
+                </a:defRPr>
+              </a:lvl5pPr>
+              <a:lvl6pPr marL="2514600" indent="-228600" algn="l" defTabSz="914400" rtl="0" eaLnBrk="1" latinLnBrk="0" hangingPunct="1">
+                <a:lnSpc>
+                  <a:spcPct val="90000"/>
+                </a:lnSpc>
+                <a:spcBef>
+                  <a:spcPts val="500"/>
+                </a:spcBef>
+                <a:buFont typeface="Arial" panose="020B0604020202020204" pitchFamily="34" charset="0"/>
+                <a:buChar char="•"/>
+                <a:defRPr sz="1800" kern="1200">
+                  <a:solidFill>
+                    <a:schemeClr val="tx1"/>
+                  </a:solidFill>
+                  <a:latin typeface="+mn-lt"/>
+                  <a:ea typeface="+mn-ea"/>
+                  <a:cs typeface="+mn-cs"/>
+                </a:defRPr>
+              </a:lvl6pPr>
+              <a:lvl7pPr marL="2971800" indent="-228600" algn="l" defTabSz="914400" rtl="0" eaLnBrk="1" latinLnBrk="0" hangingPunct="1">
+                <a:lnSpc>
+                  <a:spcPct val="90000"/>
+                </a:lnSpc>
+                <a:spcBef>
+                  <a:spcPts val="500"/>
+                </a:spcBef>
+                <a:buFont typeface="Arial" panose="020B0604020202020204" pitchFamily="34" charset="0"/>
+                <a:buChar char="•"/>
+                <a:defRPr sz="1800" kern="1200">
+                  <a:solidFill>
+                    <a:schemeClr val="tx1"/>
+                  </a:solidFill>
+                  <a:latin typeface="+mn-lt"/>
+                  <a:ea typeface="+mn-ea"/>
+                  <a:cs typeface="+mn-cs"/>
+                </a:defRPr>
+              </a:lvl7pPr>
+              <a:lvl8pPr marL="3429000" indent="-228600" algn="l" defTabSz="914400" rtl="0" eaLnBrk="1" latinLnBrk="0" hangingPunct="1">
+                <a:lnSpc>
+                  <a:spcPct val="90000"/>
+                </a:lnSpc>
+                <a:spcBef>
+                  <a:spcPts val="500"/>
+                </a:spcBef>
+                <a:buFont typeface="Arial" panose="020B0604020202020204" pitchFamily="34" charset="0"/>
+                <a:buChar char="•"/>
+                <a:defRPr sz="1800" kern="1200">
+                  <a:solidFill>
+                    <a:schemeClr val="tx1"/>
+                  </a:solidFill>
+                  <a:latin typeface="+mn-lt"/>
+                  <a:ea typeface="+mn-ea"/>
+                  <a:cs typeface="+mn-cs"/>
+                </a:defRPr>
+              </a:lvl8pPr>
+              <a:lvl9pPr marL="3886200" indent="-228600" algn="l" defTabSz="914400" rtl="0" eaLnBrk="1" latinLnBrk="0" hangingPunct="1">
+                <a:lnSpc>
+                  <a:spcPct val="90000"/>
+                </a:lnSpc>
+                <a:spcBef>
+                  <a:spcPts val="500"/>
+                </a:spcBef>
+                <a:buFont typeface="Arial" panose="020B0604020202020204" pitchFamily="34" charset="0"/>
+                <a:buChar char="•"/>
+                <a:defRPr sz="1800" kern="1200">
+                  <a:solidFill>
+                    <a:schemeClr val="tx1"/>
+                  </a:solidFill>
+                  <a:latin typeface="+mn-lt"/>
+                  <a:ea typeface="+mn-ea"/>
+                  <a:cs typeface="+mn-cs"/>
+                </a:defRPr>
+              </a:lvl9pPr>
+            </a:lstStyle>
+            <a:p>
+              <a:pPr marL="0" indent="0" algn="ctr">
+                <a:buFont typeface="Arial" panose="020B0604020202020204" pitchFamily="34" charset="0"/>
+                <a:buNone/>
+              </a:pPr>
+              <a:r>
+                <a:rPr lang="en-US" b="1">
+                  <a:solidFill>
+                    <a:schemeClr val="bg1"/>
+                  </a:solidFill>
+                  <a:latin typeface="Segoe UI Emoji" panose="020B0502040204020203" pitchFamily="34" charset="0"/>
+                  <a:ea typeface="Segoe UI Emoji" panose="020B0502040204020203" pitchFamily="34" charset="0"/>
+                </a:rPr>
+                <a:t>Data Warehouse</a:t>
+              </a:r>
+              <a:endParaRPr lang="en-US" b="1" dirty="0">
+                <a:solidFill>
+                  <a:schemeClr val="bg1"/>
+                </a:solidFill>
+                <a:latin typeface="Segoe UI Emoji" panose="020B0502040204020203" pitchFamily="34" charset="0"/>
+                <a:ea typeface="Segoe UI Emoji" panose="020B0502040204020203" pitchFamily="34" charset="0"/>
+              </a:endParaRPr>
+            </a:p>
+          </p:txBody>
+        </p:sp>
+      </p:grpSp>
+      <p:cxnSp>
+        <p:nvCxnSpPr>
+          <p:cNvPr id="20" name="Straight Arrow Connector 19">
+            <a:extLst>
+              <a:ext uri="{FF2B5EF4-FFF2-40B4-BE49-F238E27FC236}">
+                <a16:creationId xmlns:a16="http://schemas.microsoft.com/office/drawing/2014/main" id="{86783C2B-7090-4F8C-82D8-3B5D83C7F19E}"/>
+              </a:ext>
+            </a:extLst>
+          </p:cNvPr>
+          <p:cNvCxnSpPr>
+            <a:cxnSpLocks/>
+            <a:stCxn id="18" idx="1"/>
+            <a:endCxn id="7" idx="5"/>
+          </p:cNvCxnSpPr>
+          <p:nvPr/>
+        </p:nvCxnSpPr>
+        <p:spPr>
+          <a:xfrm flipH="1" flipV="1">
+            <a:off x="6630925" y="-252478"/>
+            <a:ext cx="1735173" cy="3769375"/>
+          </a:xfrm>
+          <a:prstGeom prst="straightConnector1">
+            <a:avLst/>
+          </a:prstGeom>
+          <a:ln w="19050">
+            <a:solidFill>
+              <a:schemeClr val="tx1"/>
+            </a:solidFill>
+            <a:prstDash val="dash"/>
+            <a:headEnd type="triangle"/>
+            <a:tailEnd type="triangle"/>
+          </a:ln>
+        </p:spPr>
+        <p:style>
+          <a:lnRef idx="1">
+            <a:schemeClr val="accent1"/>
+          </a:lnRef>
+          <a:fillRef idx="0">
+            <a:schemeClr val="accent1"/>
+          </a:fillRef>
+          <a:effectRef idx="0">
+            <a:schemeClr val="accent1"/>
+          </a:effectRef>
+          <a:fontRef idx="minor">
+            <a:schemeClr val="tx1"/>
+          </a:fontRef>
+        </p:style>
+      </p:cxnSp>
+      <p:pic>
+        <p:nvPicPr>
+          <p:cNvPr id="7" name="Picture 6" descr="A cat sitting on a table&#10;&#10;Description generated with high confidence">
+            <a:extLst>
+              <a:ext uri="{FF2B5EF4-FFF2-40B4-BE49-F238E27FC236}">
+                <a16:creationId xmlns:a16="http://schemas.microsoft.com/office/drawing/2014/main" id="{3A8A6F68-2BFF-4378-8C8B-8831B7A72536}"/>
+              </a:ext>
+            </a:extLst>
+          </p:cNvPr>
+          <p:cNvPicPr>
+            <a:picLocks noChangeAspect="1"/>
+          </p:cNvPicPr>
+          <p:nvPr/>
+        </p:nvPicPr>
+        <p:blipFill>
+          <a:blip r:embed="rId3">
+            <a:extLst>
+              <a:ext uri="{28A0092B-C50C-407E-A947-70E740481C1C}">
+                <a14:useLocalDpi xmlns:a14="http://schemas.microsoft.com/office/drawing/2010/main" val="0"/>
+              </a:ext>
+            </a:extLst>
+          </a:blip>
+          <a:stretch>
+            <a:fillRect/>
+          </a:stretch>
+        </p:blipFill>
+        <p:spPr>
+          <a:xfrm>
+            <a:off x="4370758" y="-1724025"/>
+            <a:ext cx="2647950" cy="1724025"/>
+          </a:xfrm>
+          <a:prstGeom prst="ellipse">
+            <a:avLst/>
+          </a:prstGeom>
+          <a:ln w="63500" cap="rnd">
+            <a:noFill/>
+          </a:ln>
+          <a:effectLst>
+            <a:outerShdw blurRad="381000" dist="292100" dir="5400000" sx="-80000" sy="-18000" rotWithShape="0">
+              <a:srgbClr val="000000">
+                <a:alpha val="22000"/>
+              </a:srgbClr>
+            </a:outerShdw>
+          </a:effectLst>
+          <a:scene3d>
+            <a:camera prst="orthographicFront"/>
+            <a:lightRig rig="contrasting" dir="t">
+              <a:rot lat="0" lon="0" rev="3000000"/>
+            </a:lightRig>
+          </a:scene3d>
+          <a:sp3d contourW="7620">
+            <a:bevelT w="95250" h="31750"/>
+            <a:contourClr>
+              <a:srgbClr val="333333"/>
+            </a:contourClr>
+          </a:sp3d>
+        </p:spPr>
+      </p:pic>
+      <p:sp>
+        <p:nvSpPr>
+          <p:cNvPr id="25" name="Rectangle 24">
+            <a:extLst>
+              <a:ext uri="{FF2B5EF4-FFF2-40B4-BE49-F238E27FC236}">
+                <a16:creationId xmlns:a16="http://schemas.microsoft.com/office/drawing/2014/main" id="{56A34DBF-A11C-4B28-9434-F2F6D98A75FD}"/>
+              </a:ext>
+            </a:extLst>
+          </p:cNvPr>
+          <p:cNvSpPr/>
+          <p:nvPr/>
+        </p:nvSpPr>
+        <p:spPr>
+          <a:xfrm>
+            <a:off x="1137642" y="223073"/>
+            <a:ext cx="10014857" cy="967259"/>
+          </a:xfrm>
+          <a:prstGeom prst="rect">
+            <a:avLst/>
+          </a:prstGeom>
+          <a:solidFill>
+            <a:schemeClr val="accent2">
+              <a:lumMod val="60000"/>
+              <a:lumOff val="40000"/>
+              <a:alpha val="90000"/>
+            </a:schemeClr>
+          </a:solidFill>
+        </p:spPr>
+        <p:style>
+          <a:lnRef idx="2">
+            <a:schemeClr val="accent1">
+              <a:shade val="50000"/>
+            </a:schemeClr>
+          </a:lnRef>
+          <a:fillRef idx="1">
+            <a:schemeClr val="accent1"/>
+          </a:fillRef>
+          <a:effectRef idx="0">
+            <a:schemeClr val="accent1"/>
+          </a:effectRef>
+          <a:fontRef idx="minor">
+            <a:schemeClr val="lt1"/>
+          </a:fontRef>
+        </p:style>
+        <p:txBody>
+          <a:bodyPr rtlCol="0" anchor="ctr"/>
+          <a:lstStyle/>
+          <a:p>
+            <a:pPr algn="ctr"/>
+            <a:r>
+              <a:rPr lang="en-US" sz="2800" dirty="0">
+                <a:latin typeface="Segoe UI Emoji" panose="020B0502040204020203" pitchFamily="34" charset="0"/>
+                <a:ea typeface="Segoe UI Emoji" panose="020B0502040204020203" pitchFamily="34" charset="0"/>
+              </a:rPr>
+              <a:t>DMZ/Perimeter Network</a:t>
+            </a:r>
+          </a:p>
+        </p:txBody>
+      </p:sp>
+    </p:spTree>
+    <p:extLst>
+      <p:ext uri="{BB962C8B-B14F-4D97-AF65-F5344CB8AC3E}">
+        <p14:creationId xmlns:p14="http://schemas.microsoft.com/office/powerpoint/2010/main" val="3552891584"/>
+      </p:ext>
+    </p:extLst>
+  </p:cSld>
+  <p:clrMapOvr>
+    <a:masterClrMapping/>
+  </p:clrMapOvr>
+</p:sld>
+</file>
+
+<file path=ppt/slides/slide4.xml><?xml version="1.0" encoding="utf-8"?>
+<p:sld xmlns:a="http://schemas.openxmlformats.org/drawingml/2006/main" xmlns:r="http://schemas.openxmlformats.org/officeDocument/2006/relationships" xmlns:p="http://schemas.openxmlformats.org/presentationml/2006/main">
+  <p:cSld>
+    <p:spTree>
+      <p:nvGrpSpPr>
+        <p:cNvPr id="1" name=""/>
+        <p:cNvGrpSpPr/>
+        <p:nvPr/>
+      </p:nvGrpSpPr>
+      <p:grpSpPr>
+        <a:xfrm>
+          <a:off x="0" y="0"/>
+          <a:ext cx="0" cy="0"/>
+          <a:chOff x="0" y="0"/>
+          <a:chExt cx="0" cy="0"/>
+        </a:xfrm>
+      </p:grpSpPr>
+      <p:pic>
+        <p:nvPicPr>
+          <p:cNvPr id="5" name="Picture 4">
+            <a:extLst>
+              <a:ext uri="{FF2B5EF4-FFF2-40B4-BE49-F238E27FC236}">
+                <a16:creationId xmlns:a16="http://schemas.microsoft.com/office/drawing/2014/main" id="{9916519E-40B8-4ECC-B1C3-BD21A67A9F9C}"/>
+              </a:ext>
+            </a:extLst>
+          </p:cNvPr>
+          <p:cNvPicPr>
+            <a:picLocks noChangeAspect="1"/>
+          </p:cNvPicPr>
+          <p:nvPr/>
+        </p:nvPicPr>
+        <p:blipFill>
+          <a:blip r:embed="rId2"/>
+          <a:stretch>
+            <a:fillRect/>
+          </a:stretch>
+        </p:blipFill>
+        <p:spPr>
+          <a:xfrm>
+            <a:off x="7027971" y="1846943"/>
+            <a:ext cx="5164030" cy="4296229"/>
+          </a:xfrm>
+          <a:prstGeom prst="rect">
+            <a:avLst/>
+          </a:prstGeom>
+        </p:spPr>
+      </p:pic>
+      <p:pic>
+        <p:nvPicPr>
+          <p:cNvPr id="20" name="Picture 19">
+            <a:extLst>
+              <a:ext uri="{FF2B5EF4-FFF2-40B4-BE49-F238E27FC236}">
+                <a16:creationId xmlns:a16="http://schemas.microsoft.com/office/drawing/2014/main" id="{DB6294A0-774F-49BE-BCCA-F5B361D0ACC2}"/>
+              </a:ext>
+            </a:extLst>
+          </p:cNvPr>
+          <p:cNvPicPr>
+            <a:picLocks noChangeAspect="1"/>
+          </p:cNvPicPr>
+          <p:nvPr/>
+        </p:nvPicPr>
+        <p:blipFill>
+          <a:blip r:embed="rId3"/>
+          <a:stretch>
+            <a:fillRect/>
+          </a:stretch>
+        </p:blipFill>
+        <p:spPr>
+          <a:xfrm>
+            <a:off x="1793940" y="1828800"/>
+            <a:ext cx="5234031" cy="4296229"/>
+          </a:xfrm>
+          <a:prstGeom prst="rect">
+            <a:avLst/>
+          </a:prstGeom>
+        </p:spPr>
+      </p:pic>
+      <p:cxnSp>
+        <p:nvCxnSpPr>
+          <p:cNvPr id="21" name="Straight Arrow Connector 20">
+            <a:extLst>
+              <a:ext uri="{FF2B5EF4-FFF2-40B4-BE49-F238E27FC236}">
+                <a16:creationId xmlns:a16="http://schemas.microsoft.com/office/drawing/2014/main" id="{5D35D817-6B14-475B-805B-F9AB23054377}"/>
+              </a:ext>
+            </a:extLst>
+          </p:cNvPr>
+          <p:cNvCxnSpPr>
+            <a:cxnSpLocks/>
+          </p:cNvCxnSpPr>
+          <p:nvPr/>
+        </p:nvCxnSpPr>
+        <p:spPr>
+          <a:xfrm flipV="1">
+            <a:off x="1659763" y="1828801"/>
+            <a:ext cx="0" cy="4296229"/>
+          </a:xfrm>
+          <a:prstGeom prst="straightConnector1">
+            <a:avLst/>
+          </a:prstGeom>
+          <a:ln w="25400">
+            <a:solidFill>
+              <a:srgbClr val="00B0F0">
+                <a:alpha val="60000"/>
+              </a:srgbClr>
+            </a:solidFill>
+            <a:prstDash val="solid"/>
+            <a:headEnd type="none"/>
+            <a:tailEnd type="none"/>
+          </a:ln>
+        </p:spPr>
+        <p:style>
+          <a:lnRef idx="1">
+            <a:schemeClr val="accent1"/>
+          </a:lnRef>
+          <a:fillRef idx="0">
+            <a:schemeClr val="accent1"/>
+          </a:fillRef>
+          <a:effectRef idx="0">
+            <a:schemeClr val="accent1"/>
+          </a:effectRef>
+          <a:fontRef idx="minor">
+            <a:schemeClr val="tx1"/>
+          </a:fontRef>
+        </p:style>
+      </p:cxnSp>
+      <p:sp>
+        <p:nvSpPr>
+          <p:cNvPr id="25" name="Content Placeholder 2">
+            <a:extLst>
+              <a:ext uri="{FF2B5EF4-FFF2-40B4-BE49-F238E27FC236}">
+                <a16:creationId xmlns:a16="http://schemas.microsoft.com/office/drawing/2014/main" id="{6E024AA3-F699-43FE-92B3-2FCA7D9D066A}"/>
+              </a:ext>
+            </a:extLst>
+          </p:cNvPr>
+          <p:cNvSpPr>
+            <a:spLocks noGrp="1"/>
+          </p:cNvSpPr>
+          <p:nvPr>
+            <p:ph idx="1"/>
+          </p:nvPr>
+        </p:nvSpPr>
+        <p:spPr>
+          <a:xfrm>
+            <a:off x="0" y="1846943"/>
+            <a:ext cx="1525587" cy="646848"/>
+          </a:xfrm>
+        </p:spPr>
+        <p:txBody>
+          <a:bodyPr>
+            <a:normAutofit/>
+          </a:bodyPr>
+          <a:lstStyle/>
+          <a:p>
+            <a:pPr marL="0" indent="0" algn="r">
+              <a:buNone/>
+            </a:pPr>
+            <a:r>
+              <a:rPr lang="en-US" b="1" dirty="0">
+                <a:latin typeface="Segoe UI Emoji" panose="020B0502040204020203" pitchFamily="34" charset="0"/>
+                <a:ea typeface="Segoe UI Emoji" panose="020B0502040204020203" pitchFamily="34" charset="0"/>
+              </a:rPr>
+              <a:t>Users</a:t>
+            </a:r>
+          </a:p>
+        </p:txBody>
+      </p:sp>
+      <p:sp>
+        <p:nvSpPr>
+          <p:cNvPr id="27" name="Content Placeholder 2">
+            <a:extLst>
+              <a:ext uri="{FF2B5EF4-FFF2-40B4-BE49-F238E27FC236}">
+                <a16:creationId xmlns:a16="http://schemas.microsoft.com/office/drawing/2014/main" id="{946E8EFF-AF45-4403-B410-B25E95F3CE2C}"/>
+              </a:ext>
+            </a:extLst>
+          </p:cNvPr>
+          <p:cNvSpPr txBox="1">
+            <a:spLocks/>
+          </p:cNvSpPr>
+          <p:nvPr/>
+        </p:nvSpPr>
+        <p:spPr>
+          <a:xfrm>
+            <a:off x="0" y="4532085"/>
+            <a:ext cx="1525581" cy="1415143"/>
+          </a:xfrm>
+          <a:prstGeom prst="rect">
+            <a:avLst/>
+          </a:prstGeom>
+        </p:spPr>
+        <p:txBody>
+          <a:bodyPr vert="horz" lIns="91440" tIns="45720" rIns="91440" bIns="45720" rtlCol="0">
+            <a:normAutofit/>
+          </a:bodyPr>
+          <a:lstStyle>
+            <a:lvl1pPr marL="228600" indent="-228600" algn="l" defTabSz="914400" rtl="0" eaLnBrk="1" latinLnBrk="0" hangingPunct="1">
+              <a:lnSpc>
+                <a:spcPct val="90000"/>
+              </a:lnSpc>
+              <a:spcBef>
+                <a:spcPts val="1000"/>
+              </a:spcBef>
+              <a:buFont typeface="Arial" panose="020B0604020202020204" pitchFamily="34" charset="0"/>
+              <a:buChar char="•"/>
+              <a:defRPr sz="2800" kern="1200">
+                <a:solidFill>
+                  <a:schemeClr val="tx1"/>
+                </a:solidFill>
+                <a:latin typeface="+mn-lt"/>
+                <a:ea typeface="+mn-ea"/>
+                <a:cs typeface="+mn-cs"/>
+              </a:defRPr>
+            </a:lvl1pPr>
+            <a:lvl2pPr marL="685800" indent="-228600" algn="l" defTabSz="914400" rtl="0" eaLnBrk="1" latinLnBrk="0" hangingPunct="1">
+              <a:lnSpc>
+                <a:spcPct val="90000"/>
+              </a:lnSpc>
+              <a:spcBef>
+                <a:spcPts val="500"/>
+              </a:spcBef>
+              <a:buFont typeface="Arial" panose="020B0604020202020204" pitchFamily="34" charset="0"/>
+              <a:buChar char="•"/>
+              <a:defRPr sz="2400" kern="1200">
+                <a:solidFill>
+                  <a:schemeClr val="tx1"/>
+                </a:solidFill>
+                <a:latin typeface="+mn-lt"/>
+                <a:ea typeface="+mn-ea"/>
+                <a:cs typeface="+mn-cs"/>
+              </a:defRPr>
+            </a:lvl2pPr>
+            <a:lvl3pPr marL="1143000" indent="-228600" algn="l" defTabSz="914400" rtl="0" eaLnBrk="1" latinLnBrk="0" hangingPunct="1">
+              <a:lnSpc>
+                <a:spcPct val="90000"/>
+              </a:lnSpc>
+              <a:spcBef>
+                <a:spcPts val="500"/>
+              </a:spcBef>
+              <a:buFont typeface="Arial" panose="020B0604020202020204" pitchFamily="34" charset="0"/>
+              <a:buChar char="•"/>
+              <a:defRPr sz="2000" kern="1200">
+                <a:solidFill>
+                  <a:schemeClr val="tx1"/>
+                </a:solidFill>
+                <a:latin typeface="+mn-lt"/>
+                <a:ea typeface="+mn-ea"/>
+                <a:cs typeface="+mn-cs"/>
+              </a:defRPr>
+            </a:lvl3pPr>
+            <a:lvl4pPr marL="1600200" indent="-228600" algn="l" defTabSz="914400" rtl="0" eaLnBrk="1" latinLnBrk="0" hangingPunct="1">
+              <a:lnSpc>
+                <a:spcPct val="90000"/>
+              </a:lnSpc>
+              <a:spcBef>
+                <a:spcPts val="500"/>
+              </a:spcBef>
+              <a:buFont typeface="Arial" panose="020B0604020202020204" pitchFamily="34" charset="0"/>
+              <a:buChar char="•"/>
+              <a:defRPr sz="1800" kern="1200">
+                <a:solidFill>
+                  <a:schemeClr val="tx1"/>
+                </a:solidFill>
+                <a:latin typeface="+mn-lt"/>
+                <a:ea typeface="+mn-ea"/>
+                <a:cs typeface="+mn-cs"/>
+              </a:defRPr>
+            </a:lvl4pPr>
+            <a:lvl5pPr marL="2057400" indent="-228600" algn="l" defTabSz="914400" rtl="0" eaLnBrk="1" latinLnBrk="0" hangingPunct="1">
+              <a:lnSpc>
+                <a:spcPct val="90000"/>
+              </a:lnSpc>
+              <a:spcBef>
+                <a:spcPts val="500"/>
+              </a:spcBef>
+              <a:buFont typeface="Arial" panose="020B0604020202020204" pitchFamily="34" charset="0"/>
+              <a:buChar char="•"/>
+              <a:defRPr sz="1800" kern="1200">
+                <a:solidFill>
+                  <a:schemeClr val="tx1"/>
+                </a:solidFill>
+                <a:latin typeface="+mn-lt"/>
+                <a:ea typeface="+mn-ea"/>
+                <a:cs typeface="+mn-cs"/>
+              </a:defRPr>
+            </a:lvl5pPr>
+            <a:lvl6pPr marL="2514600" indent="-228600" algn="l" defTabSz="914400" rtl="0" eaLnBrk="1" latinLnBrk="0" hangingPunct="1">
+              <a:lnSpc>
+                <a:spcPct val="90000"/>
+              </a:lnSpc>
+              <a:spcBef>
+                <a:spcPts val="500"/>
+              </a:spcBef>
+              <a:buFont typeface="Arial" panose="020B0604020202020204" pitchFamily="34" charset="0"/>
+              <a:buChar char="•"/>
+              <a:defRPr sz="1800" kern="1200">
+                <a:solidFill>
+                  <a:schemeClr val="tx1"/>
+                </a:solidFill>
+                <a:latin typeface="+mn-lt"/>
+                <a:ea typeface="+mn-ea"/>
+                <a:cs typeface="+mn-cs"/>
+              </a:defRPr>
+            </a:lvl6pPr>
+            <a:lvl7pPr marL="2971800" indent="-228600" algn="l" defTabSz="914400" rtl="0" eaLnBrk="1" latinLnBrk="0" hangingPunct="1">
+              <a:lnSpc>
+                <a:spcPct val="90000"/>
+              </a:lnSpc>
+              <a:spcBef>
+                <a:spcPts val="500"/>
+              </a:spcBef>
+              <a:buFont typeface="Arial" panose="020B0604020202020204" pitchFamily="34" charset="0"/>
+              <a:buChar char="•"/>
+              <a:defRPr sz="1800" kern="1200">
+                <a:solidFill>
+                  <a:schemeClr val="tx1"/>
+                </a:solidFill>
+                <a:latin typeface="+mn-lt"/>
+                <a:ea typeface="+mn-ea"/>
+                <a:cs typeface="+mn-cs"/>
+              </a:defRPr>
+            </a:lvl7pPr>
+            <a:lvl8pPr marL="3429000" indent="-228600" algn="l" defTabSz="914400" rtl="0" eaLnBrk="1" latinLnBrk="0" hangingPunct="1">
+              <a:lnSpc>
+                <a:spcPct val="90000"/>
+              </a:lnSpc>
+              <a:spcBef>
+                <a:spcPts val="500"/>
+              </a:spcBef>
+              <a:buFont typeface="Arial" panose="020B0604020202020204" pitchFamily="34" charset="0"/>
+              <a:buChar char="•"/>
+              <a:defRPr sz="1800" kern="1200">
+                <a:solidFill>
+                  <a:schemeClr val="tx1"/>
+                </a:solidFill>
+                <a:latin typeface="+mn-lt"/>
+                <a:ea typeface="+mn-ea"/>
+                <a:cs typeface="+mn-cs"/>
+              </a:defRPr>
+            </a:lvl8pPr>
+            <a:lvl9pPr marL="3886200" indent="-228600" algn="l" defTabSz="914400" rtl="0" eaLnBrk="1" latinLnBrk="0" hangingPunct="1">
+              <a:lnSpc>
+                <a:spcPct val="90000"/>
+              </a:lnSpc>
+              <a:spcBef>
+                <a:spcPts val="500"/>
+              </a:spcBef>
+              <a:buFont typeface="Arial" panose="020B0604020202020204" pitchFamily="34" charset="0"/>
+              <a:buChar char="•"/>
+              <a:defRPr sz="1800" kern="1200">
+                <a:solidFill>
+                  <a:schemeClr val="tx1"/>
+                </a:solidFill>
+                <a:latin typeface="+mn-lt"/>
+                <a:ea typeface="+mn-ea"/>
+                <a:cs typeface="+mn-cs"/>
+              </a:defRPr>
+            </a:lvl9pPr>
+          </a:lstStyle>
+          <a:p>
+            <a:pPr marL="0" indent="0" algn="r">
+              <a:buFont typeface="Arial" panose="020B0604020202020204" pitchFamily="34" charset="0"/>
+              <a:buNone/>
+            </a:pPr>
+            <a:r>
+              <a:rPr lang="en-US" b="1" dirty="0">
+                <a:latin typeface="Segoe UI Emoji" panose="020B0502040204020203" pitchFamily="34" charset="0"/>
+                <a:ea typeface="Segoe UI Emoji" panose="020B0502040204020203" pitchFamily="34" charset="0"/>
+              </a:rPr>
+              <a:t>Backend </a:t>
+            </a:r>
+          </a:p>
+          <a:p>
+            <a:pPr marL="0" indent="0" algn="r">
+              <a:buFont typeface="Arial" panose="020B0604020202020204" pitchFamily="34" charset="0"/>
+              <a:buNone/>
+            </a:pPr>
+            <a:r>
+              <a:rPr lang="en-US" b="1" dirty="0">
+                <a:latin typeface="Segoe UI Emoji" panose="020B0502040204020203" pitchFamily="34" charset="0"/>
+                <a:ea typeface="Segoe UI Emoji" panose="020B0502040204020203" pitchFamily="34" charset="0"/>
+              </a:rPr>
+              <a:t>Systems</a:t>
+            </a:r>
+          </a:p>
+        </p:txBody>
+      </p:sp>
+      <p:pic>
+        <p:nvPicPr>
+          <p:cNvPr id="31" name="Picture 30">
+            <a:extLst>
+              <a:ext uri="{FF2B5EF4-FFF2-40B4-BE49-F238E27FC236}">
+                <a16:creationId xmlns:a16="http://schemas.microsoft.com/office/drawing/2014/main" id="{BB2EDCD2-B151-4AC9-B023-B6DA8FA1F95C}"/>
+              </a:ext>
+            </a:extLst>
+          </p:cNvPr>
+          <p:cNvPicPr>
+            <a:picLocks noChangeAspect="1"/>
+          </p:cNvPicPr>
+          <p:nvPr/>
+        </p:nvPicPr>
+        <p:blipFill>
+          <a:blip r:embed="rId4">
+            <a:extLst>
+              <a:ext uri="{28A0092B-C50C-407E-A947-70E740481C1C}">
+                <a14:useLocalDpi xmlns:a14="http://schemas.microsoft.com/office/drawing/2010/main" val="0"/>
+              </a:ext>
+            </a:extLst>
+          </a:blip>
+          <a:stretch>
+            <a:fillRect/>
+          </a:stretch>
+        </p:blipFill>
+        <p:spPr>
+          <a:xfrm>
+            <a:off x="304257" y="2915186"/>
+            <a:ext cx="917066" cy="917066"/>
+          </a:xfrm>
+          <a:prstGeom prst="rect">
+            <a:avLst/>
+          </a:prstGeom>
+        </p:spPr>
+      </p:pic>
+      <p:cxnSp>
+        <p:nvCxnSpPr>
+          <p:cNvPr id="32" name="Straight Arrow Connector 31">
+            <a:extLst>
+              <a:ext uri="{FF2B5EF4-FFF2-40B4-BE49-F238E27FC236}">
+                <a16:creationId xmlns:a16="http://schemas.microsoft.com/office/drawing/2014/main" id="{71AA0A1C-71DE-4A7B-AC09-880ABC9738E0}"/>
+              </a:ext>
+            </a:extLst>
+          </p:cNvPr>
+          <p:cNvCxnSpPr>
+            <a:cxnSpLocks/>
+            <a:stCxn id="27" idx="0"/>
+            <a:endCxn id="31" idx="2"/>
+          </p:cNvCxnSpPr>
+          <p:nvPr/>
+        </p:nvCxnSpPr>
+        <p:spPr>
+          <a:xfrm flipH="1" flipV="1">
+            <a:off x="762790" y="3832252"/>
+            <a:ext cx="1" cy="699833"/>
+          </a:xfrm>
+          <a:prstGeom prst="straightConnector1">
+            <a:avLst/>
+          </a:prstGeom>
+          <a:ln w="19050">
+            <a:solidFill>
+              <a:schemeClr val="tx1"/>
+            </a:solidFill>
+            <a:prstDash val="dash"/>
+            <a:headEnd type="triangle"/>
+            <a:tailEnd type="triangle"/>
+          </a:ln>
+        </p:spPr>
+        <p:style>
+          <a:lnRef idx="1">
+            <a:schemeClr val="accent1"/>
+          </a:lnRef>
+          <a:fillRef idx="0">
+            <a:schemeClr val="accent1"/>
+          </a:fillRef>
+          <a:effectRef idx="0">
+            <a:schemeClr val="accent1"/>
+          </a:effectRef>
+          <a:fontRef idx="minor">
+            <a:schemeClr val="tx1"/>
+          </a:fontRef>
+        </p:style>
+      </p:cxnSp>
+      <p:cxnSp>
+        <p:nvCxnSpPr>
+          <p:cNvPr id="37" name="Straight Arrow Connector 36">
+            <a:extLst>
+              <a:ext uri="{FF2B5EF4-FFF2-40B4-BE49-F238E27FC236}">
+                <a16:creationId xmlns:a16="http://schemas.microsoft.com/office/drawing/2014/main" id="{EE4EEF1C-7C2A-4B34-8120-57E69A4E8E7D}"/>
+              </a:ext>
+            </a:extLst>
+          </p:cNvPr>
+          <p:cNvCxnSpPr>
+            <a:cxnSpLocks/>
+            <a:stCxn id="31" idx="0"/>
+            <a:endCxn id="25" idx="2"/>
+          </p:cNvCxnSpPr>
+          <p:nvPr/>
+        </p:nvCxnSpPr>
+        <p:spPr>
+          <a:xfrm flipV="1">
+            <a:off x="762790" y="2493791"/>
+            <a:ext cx="4" cy="421395"/>
+          </a:xfrm>
+          <a:prstGeom prst="straightConnector1">
+            <a:avLst/>
+          </a:prstGeom>
+          <a:ln w="19050">
+            <a:solidFill>
+              <a:schemeClr val="tx1"/>
+            </a:solidFill>
+            <a:prstDash val="dash"/>
+            <a:headEnd type="triangle"/>
+            <a:tailEnd type="triangle"/>
+          </a:ln>
+        </p:spPr>
+        <p:style>
+          <a:lnRef idx="1">
+            <a:schemeClr val="accent1"/>
+          </a:lnRef>
+          <a:fillRef idx="0">
+            <a:schemeClr val="accent1"/>
+          </a:fillRef>
+          <a:effectRef idx="0">
+            <a:schemeClr val="accent1"/>
+          </a:effectRef>
+          <a:fontRef idx="minor">
+            <a:schemeClr val="tx1"/>
+          </a:fontRef>
+        </p:style>
+      </p:cxnSp>
+      <p:sp>
+        <p:nvSpPr>
+          <p:cNvPr id="49" name="Content Placeholder 2">
+            <a:extLst>
+              <a:ext uri="{FF2B5EF4-FFF2-40B4-BE49-F238E27FC236}">
+                <a16:creationId xmlns:a16="http://schemas.microsoft.com/office/drawing/2014/main" id="{1B88186C-A542-4FAC-9847-D27B7A140F83}"/>
+              </a:ext>
+            </a:extLst>
+          </p:cNvPr>
+          <p:cNvSpPr txBox="1">
+            <a:spLocks/>
+          </p:cNvSpPr>
+          <p:nvPr/>
+        </p:nvSpPr>
+        <p:spPr>
+          <a:xfrm>
+            <a:off x="3480556" y="395514"/>
+            <a:ext cx="1860797" cy="1415143"/>
+          </a:xfrm>
+          <a:prstGeom prst="rect">
+            <a:avLst/>
+          </a:prstGeom>
+        </p:spPr>
+        <p:txBody>
+          <a:bodyPr vert="horz" lIns="91440" tIns="45720" rIns="91440" bIns="45720" rtlCol="0">
+            <a:normAutofit/>
+          </a:bodyPr>
+          <a:lstStyle>
+            <a:lvl1pPr marL="228600" indent="-228600" algn="l" defTabSz="914400" rtl="0" eaLnBrk="1" latinLnBrk="0" hangingPunct="1">
+              <a:lnSpc>
+                <a:spcPct val="90000"/>
+              </a:lnSpc>
+              <a:spcBef>
+                <a:spcPts val="1000"/>
+              </a:spcBef>
+              <a:buFont typeface="Arial" panose="020B0604020202020204" pitchFamily="34" charset="0"/>
+              <a:buChar char="•"/>
+              <a:defRPr sz="2800" kern="1200">
+                <a:solidFill>
+                  <a:schemeClr val="tx1"/>
+                </a:solidFill>
+                <a:latin typeface="+mn-lt"/>
+                <a:ea typeface="+mn-ea"/>
+                <a:cs typeface="+mn-cs"/>
+              </a:defRPr>
+            </a:lvl1pPr>
+            <a:lvl2pPr marL="685800" indent="-228600" algn="l" defTabSz="914400" rtl="0" eaLnBrk="1" latinLnBrk="0" hangingPunct="1">
+              <a:lnSpc>
+                <a:spcPct val="90000"/>
+              </a:lnSpc>
+              <a:spcBef>
+                <a:spcPts val="500"/>
+              </a:spcBef>
+              <a:buFont typeface="Arial" panose="020B0604020202020204" pitchFamily="34" charset="0"/>
+              <a:buChar char="•"/>
+              <a:defRPr sz="2400" kern="1200">
+                <a:solidFill>
+                  <a:schemeClr val="tx1"/>
+                </a:solidFill>
+                <a:latin typeface="+mn-lt"/>
+                <a:ea typeface="+mn-ea"/>
+                <a:cs typeface="+mn-cs"/>
+              </a:defRPr>
+            </a:lvl2pPr>
+            <a:lvl3pPr marL="1143000" indent="-228600" algn="l" defTabSz="914400" rtl="0" eaLnBrk="1" latinLnBrk="0" hangingPunct="1">
+              <a:lnSpc>
+                <a:spcPct val="90000"/>
+              </a:lnSpc>
+              <a:spcBef>
+                <a:spcPts val="500"/>
+              </a:spcBef>
+              <a:buFont typeface="Arial" panose="020B0604020202020204" pitchFamily="34" charset="0"/>
+              <a:buChar char="•"/>
+              <a:defRPr sz="2000" kern="1200">
+                <a:solidFill>
+                  <a:schemeClr val="tx1"/>
+                </a:solidFill>
+                <a:latin typeface="+mn-lt"/>
+                <a:ea typeface="+mn-ea"/>
+                <a:cs typeface="+mn-cs"/>
+              </a:defRPr>
+            </a:lvl3pPr>
+            <a:lvl4pPr marL="1600200" indent="-228600" algn="l" defTabSz="914400" rtl="0" eaLnBrk="1" latinLnBrk="0" hangingPunct="1">
+              <a:lnSpc>
+                <a:spcPct val="90000"/>
+              </a:lnSpc>
+              <a:spcBef>
+                <a:spcPts val="500"/>
+              </a:spcBef>
+              <a:buFont typeface="Arial" panose="020B0604020202020204" pitchFamily="34" charset="0"/>
+              <a:buChar char="•"/>
+              <a:defRPr sz="1800" kern="1200">
+                <a:solidFill>
+                  <a:schemeClr val="tx1"/>
+                </a:solidFill>
+                <a:latin typeface="+mn-lt"/>
+                <a:ea typeface="+mn-ea"/>
+                <a:cs typeface="+mn-cs"/>
+              </a:defRPr>
+            </a:lvl4pPr>
+            <a:lvl5pPr marL="2057400" indent="-228600" algn="l" defTabSz="914400" rtl="0" eaLnBrk="1" latinLnBrk="0" hangingPunct="1">
+              <a:lnSpc>
+                <a:spcPct val="90000"/>
+              </a:lnSpc>
+              <a:spcBef>
+                <a:spcPts val="500"/>
+              </a:spcBef>
+              <a:buFont typeface="Arial" panose="020B0604020202020204" pitchFamily="34" charset="0"/>
+              <a:buChar char="•"/>
+              <a:defRPr sz="1800" kern="1200">
+                <a:solidFill>
+                  <a:schemeClr val="tx1"/>
+                </a:solidFill>
+                <a:latin typeface="+mn-lt"/>
+                <a:ea typeface="+mn-ea"/>
+                <a:cs typeface="+mn-cs"/>
+              </a:defRPr>
+            </a:lvl5pPr>
+            <a:lvl6pPr marL="2514600" indent="-228600" algn="l" defTabSz="914400" rtl="0" eaLnBrk="1" latinLnBrk="0" hangingPunct="1">
+              <a:lnSpc>
+                <a:spcPct val="90000"/>
+              </a:lnSpc>
+              <a:spcBef>
+                <a:spcPts val="500"/>
+              </a:spcBef>
+              <a:buFont typeface="Arial" panose="020B0604020202020204" pitchFamily="34" charset="0"/>
+              <a:buChar char="•"/>
+              <a:defRPr sz="1800" kern="1200">
+                <a:solidFill>
+                  <a:schemeClr val="tx1"/>
+                </a:solidFill>
+                <a:latin typeface="+mn-lt"/>
+                <a:ea typeface="+mn-ea"/>
+                <a:cs typeface="+mn-cs"/>
+              </a:defRPr>
+            </a:lvl6pPr>
+            <a:lvl7pPr marL="2971800" indent="-228600" algn="l" defTabSz="914400" rtl="0" eaLnBrk="1" latinLnBrk="0" hangingPunct="1">
+              <a:lnSpc>
+                <a:spcPct val="90000"/>
+              </a:lnSpc>
+              <a:spcBef>
+                <a:spcPts val="500"/>
+              </a:spcBef>
+              <a:buFont typeface="Arial" panose="020B0604020202020204" pitchFamily="34" charset="0"/>
+              <a:buChar char="•"/>
+              <a:defRPr sz="1800" kern="1200">
+                <a:solidFill>
+                  <a:schemeClr val="tx1"/>
+                </a:solidFill>
+                <a:latin typeface="+mn-lt"/>
+                <a:ea typeface="+mn-ea"/>
+                <a:cs typeface="+mn-cs"/>
+              </a:defRPr>
+            </a:lvl7pPr>
+            <a:lvl8pPr marL="3429000" indent="-228600" algn="l" defTabSz="914400" rtl="0" eaLnBrk="1" latinLnBrk="0" hangingPunct="1">
+              <a:lnSpc>
+                <a:spcPct val="90000"/>
+              </a:lnSpc>
+              <a:spcBef>
+                <a:spcPts val="500"/>
+              </a:spcBef>
+              <a:buFont typeface="Arial" panose="020B0604020202020204" pitchFamily="34" charset="0"/>
+              <a:buChar char="•"/>
+              <a:defRPr sz="1800" kern="1200">
+                <a:solidFill>
+                  <a:schemeClr val="tx1"/>
+                </a:solidFill>
+                <a:latin typeface="+mn-lt"/>
+                <a:ea typeface="+mn-ea"/>
+                <a:cs typeface="+mn-cs"/>
+              </a:defRPr>
+            </a:lvl8pPr>
+            <a:lvl9pPr marL="3886200" indent="-228600" algn="l" defTabSz="914400" rtl="0" eaLnBrk="1" latinLnBrk="0" hangingPunct="1">
+              <a:lnSpc>
+                <a:spcPct val="90000"/>
+              </a:lnSpc>
+              <a:spcBef>
+                <a:spcPts val="500"/>
+              </a:spcBef>
+              <a:buFont typeface="Arial" panose="020B0604020202020204" pitchFamily="34" charset="0"/>
+              <a:buChar char="•"/>
+              <a:defRPr sz="1800" kern="1200">
+                <a:solidFill>
+                  <a:schemeClr val="tx1"/>
+                </a:solidFill>
+                <a:latin typeface="+mn-lt"/>
+                <a:ea typeface="+mn-ea"/>
+                <a:cs typeface="+mn-cs"/>
+              </a:defRPr>
+            </a:lvl9pPr>
+          </a:lstStyle>
+          <a:p>
+            <a:pPr marL="0" indent="0" algn="ctr">
+              <a:buFont typeface="Arial" panose="020B0604020202020204" pitchFamily="34" charset="0"/>
+              <a:buNone/>
+            </a:pPr>
+            <a:r>
+              <a:rPr lang="en-US" sz="3600" b="1" dirty="0">
+                <a:latin typeface="Segoe UI Emoji" panose="020B0502040204020203" pitchFamily="34" charset="0"/>
+                <a:ea typeface="Segoe UI Emoji" panose="020B0502040204020203" pitchFamily="34" charset="0"/>
+              </a:rPr>
+              <a:t>Typical REST</a:t>
+            </a:r>
+          </a:p>
+        </p:txBody>
+      </p:sp>
+      <p:sp>
+        <p:nvSpPr>
+          <p:cNvPr id="50" name="Content Placeholder 2">
+            <a:extLst>
+              <a:ext uri="{FF2B5EF4-FFF2-40B4-BE49-F238E27FC236}">
+                <a16:creationId xmlns:a16="http://schemas.microsoft.com/office/drawing/2014/main" id="{0FD53FA0-2DA0-4881-B0BA-166019152981}"/>
+              </a:ext>
+            </a:extLst>
+          </p:cNvPr>
+          <p:cNvSpPr txBox="1">
+            <a:spLocks/>
+          </p:cNvSpPr>
+          <p:nvPr/>
+        </p:nvSpPr>
+        <p:spPr>
+          <a:xfrm>
+            <a:off x="8461829" y="885371"/>
+            <a:ext cx="2177142" cy="925286"/>
+          </a:xfrm>
+          <a:prstGeom prst="rect">
+            <a:avLst/>
+          </a:prstGeom>
+        </p:spPr>
+        <p:txBody>
+          <a:bodyPr vert="horz" lIns="91440" tIns="45720" rIns="91440" bIns="45720" rtlCol="0">
+            <a:normAutofit/>
+          </a:bodyPr>
+          <a:lstStyle>
+            <a:lvl1pPr marL="228600" indent="-228600" algn="l" defTabSz="914400" rtl="0" eaLnBrk="1" latinLnBrk="0" hangingPunct="1">
+              <a:lnSpc>
+                <a:spcPct val="90000"/>
+              </a:lnSpc>
+              <a:spcBef>
+                <a:spcPts val="1000"/>
+              </a:spcBef>
+              <a:buFont typeface="Arial" panose="020B0604020202020204" pitchFamily="34" charset="0"/>
+              <a:buChar char="•"/>
+              <a:defRPr sz="2800" kern="1200">
+                <a:solidFill>
+                  <a:schemeClr val="tx1"/>
+                </a:solidFill>
+                <a:latin typeface="+mn-lt"/>
+                <a:ea typeface="+mn-ea"/>
+                <a:cs typeface="+mn-cs"/>
+              </a:defRPr>
+            </a:lvl1pPr>
+            <a:lvl2pPr marL="685800" indent="-228600" algn="l" defTabSz="914400" rtl="0" eaLnBrk="1" latinLnBrk="0" hangingPunct="1">
+              <a:lnSpc>
+                <a:spcPct val="90000"/>
+              </a:lnSpc>
+              <a:spcBef>
+                <a:spcPts val="500"/>
+              </a:spcBef>
+              <a:buFont typeface="Arial" panose="020B0604020202020204" pitchFamily="34" charset="0"/>
+              <a:buChar char="•"/>
+              <a:defRPr sz="2400" kern="1200">
+                <a:solidFill>
+                  <a:schemeClr val="tx1"/>
+                </a:solidFill>
+                <a:latin typeface="+mn-lt"/>
+                <a:ea typeface="+mn-ea"/>
+                <a:cs typeface="+mn-cs"/>
+              </a:defRPr>
+            </a:lvl2pPr>
+            <a:lvl3pPr marL="1143000" indent="-228600" algn="l" defTabSz="914400" rtl="0" eaLnBrk="1" latinLnBrk="0" hangingPunct="1">
+              <a:lnSpc>
+                <a:spcPct val="90000"/>
+              </a:lnSpc>
+              <a:spcBef>
+                <a:spcPts val="500"/>
+              </a:spcBef>
+              <a:buFont typeface="Arial" panose="020B0604020202020204" pitchFamily="34" charset="0"/>
+              <a:buChar char="•"/>
+              <a:defRPr sz="2000" kern="1200">
+                <a:solidFill>
+                  <a:schemeClr val="tx1"/>
+                </a:solidFill>
+                <a:latin typeface="+mn-lt"/>
+                <a:ea typeface="+mn-ea"/>
+                <a:cs typeface="+mn-cs"/>
+              </a:defRPr>
+            </a:lvl3pPr>
+            <a:lvl4pPr marL="1600200" indent="-228600" algn="l" defTabSz="914400" rtl="0" eaLnBrk="1" latinLnBrk="0" hangingPunct="1">
+              <a:lnSpc>
+                <a:spcPct val="90000"/>
+              </a:lnSpc>
+              <a:spcBef>
+                <a:spcPts val="500"/>
+              </a:spcBef>
+              <a:buFont typeface="Arial" panose="020B0604020202020204" pitchFamily="34" charset="0"/>
+              <a:buChar char="•"/>
+              <a:defRPr sz="1800" kern="1200">
+                <a:solidFill>
+                  <a:schemeClr val="tx1"/>
+                </a:solidFill>
+                <a:latin typeface="+mn-lt"/>
+                <a:ea typeface="+mn-ea"/>
+                <a:cs typeface="+mn-cs"/>
+              </a:defRPr>
+            </a:lvl4pPr>
+            <a:lvl5pPr marL="2057400" indent="-228600" algn="l" defTabSz="914400" rtl="0" eaLnBrk="1" latinLnBrk="0" hangingPunct="1">
+              <a:lnSpc>
+                <a:spcPct val="90000"/>
+              </a:lnSpc>
+              <a:spcBef>
+                <a:spcPts val="500"/>
+              </a:spcBef>
+              <a:buFont typeface="Arial" panose="020B0604020202020204" pitchFamily="34" charset="0"/>
+              <a:buChar char="•"/>
+              <a:defRPr sz="1800" kern="1200">
+                <a:solidFill>
+                  <a:schemeClr val="tx1"/>
+                </a:solidFill>
+                <a:latin typeface="+mn-lt"/>
+                <a:ea typeface="+mn-ea"/>
+                <a:cs typeface="+mn-cs"/>
+              </a:defRPr>
+            </a:lvl5pPr>
+            <a:lvl6pPr marL="2514600" indent="-228600" algn="l" defTabSz="914400" rtl="0" eaLnBrk="1" latinLnBrk="0" hangingPunct="1">
+              <a:lnSpc>
+                <a:spcPct val="90000"/>
+              </a:lnSpc>
+              <a:spcBef>
+                <a:spcPts val="500"/>
+              </a:spcBef>
+              <a:buFont typeface="Arial" panose="020B0604020202020204" pitchFamily="34" charset="0"/>
+              <a:buChar char="•"/>
+              <a:defRPr sz="1800" kern="1200">
+                <a:solidFill>
+                  <a:schemeClr val="tx1"/>
+                </a:solidFill>
+                <a:latin typeface="+mn-lt"/>
+                <a:ea typeface="+mn-ea"/>
+                <a:cs typeface="+mn-cs"/>
+              </a:defRPr>
+            </a:lvl6pPr>
+            <a:lvl7pPr marL="2971800" indent="-228600" algn="l" defTabSz="914400" rtl="0" eaLnBrk="1" latinLnBrk="0" hangingPunct="1">
+              <a:lnSpc>
+                <a:spcPct val="90000"/>
+              </a:lnSpc>
+              <a:spcBef>
+                <a:spcPts val="500"/>
+              </a:spcBef>
+              <a:buFont typeface="Arial" panose="020B0604020202020204" pitchFamily="34" charset="0"/>
+              <a:buChar char="•"/>
+              <a:defRPr sz="1800" kern="1200">
+                <a:solidFill>
+                  <a:schemeClr val="tx1"/>
+                </a:solidFill>
+                <a:latin typeface="+mn-lt"/>
+                <a:ea typeface="+mn-ea"/>
+                <a:cs typeface="+mn-cs"/>
+              </a:defRPr>
+            </a:lvl7pPr>
+            <a:lvl8pPr marL="3429000" indent="-228600" algn="l" defTabSz="914400" rtl="0" eaLnBrk="1" latinLnBrk="0" hangingPunct="1">
+              <a:lnSpc>
+                <a:spcPct val="90000"/>
+              </a:lnSpc>
+              <a:spcBef>
+                <a:spcPts val="500"/>
+              </a:spcBef>
+              <a:buFont typeface="Arial" panose="020B0604020202020204" pitchFamily="34" charset="0"/>
+              <a:buChar char="•"/>
+              <a:defRPr sz="1800" kern="1200">
+                <a:solidFill>
+                  <a:schemeClr val="tx1"/>
+                </a:solidFill>
+                <a:latin typeface="+mn-lt"/>
+                <a:ea typeface="+mn-ea"/>
+                <a:cs typeface="+mn-cs"/>
+              </a:defRPr>
+            </a:lvl8pPr>
+            <a:lvl9pPr marL="3886200" indent="-228600" algn="l" defTabSz="914400" rtl="0" eaLnBrk="1" latinLnBrk="0" hangingPunct="1">
+              <a:lnSpc>
+                <a:spcPct val="90000"/>
+              </a:lnSpc>
+              <a:spcBef>
+                <a:spcPts val="500"/>
+              </a:spcBef>
+              <a:buFont typeface="Arial" panose="020B0604020202020204" pitchFamily="34" charset="0"/>
+              <a:buChar char="•"/>
+              <a:defRPr sz="1800" kern="1200">
+                <a:solidFill>
+                  <a:schemeClr val="tx1"/>
+                </a:solidFill>
+                <a:latin typeface="+mn-lt"/>
+                <a:ea typeface="+mn-ea"/>
+                <a:cs typeface="+mn-cs"/>
+              </a:defRPr>
+            </a:lvl9pPr>
+          </a:lstStyle>
+          <a:p>
+            <a:pPr marL="0" indent="0" algn="ctr">
+              <a:buFont typeface="Arial" panose="020B0604020202020204" pitchFamily="34" charset="0"/>
+              <a:buNone/>
+            </a:pPr>
+            <a:r>
+              <a:rPr lang="en-US" sz="3600" b="1" dirty="0" err="1">
+                <a:latin typeface="Segoe UI Emoji" panose="020B0502040204020203" pitchFamily="34" charset="0"/>
+                <a:ea typeface="Segoe UI Emoji" panose="020B0502040204020203" pitchFamily="34" charset="0"/>
+              </a:rPr>
+              <a:t>GraphQL</a:t>
+            </a:r>
+            <a:endParaRPr lang="en-US" sz="3600" b="1" dirty="0">
+              <a:latin typeface="Segoe UI Emoji" panose="020B0502040204020203" pitchFamily="34" charset="0"/>
+              <a:ea typeface="Segoe UI Emoji" panose="020B0502040204020203" pitchFamily="34" charset="0"/>
+            </a:endParaRPr>
+          </a:p>
+        </p:txBody>
+      </p:sp>
+    </p:spTree>
+    <p:extLst>
+      <p:ext uri="{BB962C8B-B14F-4D97-AF65-F5344CB8AC3E}">
+        <p14:creationId xmlns:p14="http://schemas.microsoft.com/office/powerpoint/2010/main" val="2689951476"/>
+      </p:ext>
+    </p:extLst>
+  </p:cSld>
+  <p:clrMapOvr>
+    <a:masterClrMapping/>
+  </p:clrMapOvr>
+</p:sld>
+</file>
+
 <file path=ppt/theme/theme1.xml><?xml version="1.0" encoding="utf-8"?>
 <a:theme xmlns:a="http://schemas.openxmlformats.org/drawingml/2006/main" name="Office Theme">
   <a:themeElements>

</xml_diff>